<commit_message>
presentation in progress again
</commit_message>
<xml_diff>
--- a/final_presentation/Back to home in desert.pptx
+++ b/final_presentation/Back to home in desert.pptx
@@ -120,7 +120,18 @@
   </p:defaultTextStyle>
   <p:extLst>
     <p:ext uri="{EFAFB233-063F-42B5-8137-9DF3F51BA10A}">
-      <p15:sldGuideLst xmlns:p15="http://schemas.microsoft.com/office/powerpoint/2012/main" xmlns=""/>
+      <p15:sldGuideLst xmlns:p15="http://schemas.microsoft.com/office/powerpoint/2012/main">
+        <p15:guide id="1" orient="horz" pos="2160">
+          <p15:clr>
+            <a:srgbClr val="A4A3A4"/>
+          </p15:clr>
+        </p15:guide>
+        <p15:guide id="2" pos="3840">
+          <p15:clr>
+            <a:srgbClr val="A4A3A4"/>
+          </p15:clr>
+        </p15:guide>
+      </p15:sldGuideLst>
     </p:ext>
   </p:extLst>
 </p:presentation>
@@ -378,7 +389,7 @@
     </p:spTree>
     <p:extLst>
       <p:ext uri="{BB962C8B-B14F-4D97-AF65-F5344CB8AC3E}">
-        <p14:creationId xmlns:p14="http://schemas.microsoft.com/office/powerpoint/2010/main" xmlns="" val="3639500005"/>
+        <p14:creationId xmlns:p14="http://schemas.microsoft.com/office/powerpoint/2010/main" val="3639500005"/>
       </p:ext>
     </p:extLst>
   </p:cSld>
@@ -500,7 +511,7 @@
           <p:cNvPr id="2" name="Titel 1">
             <a:extLst>
               <a:ext uri="{FF2B5EF4-FFF2-40B4-BE49-F238E27FC236}">
-                <a16:creationId xmlns:a16="http://schemas.microsoft.com/office/drawing/2014/main" xmlns="" id="{51039EB4-10B5-4D23-8B63-B96099EEE169}"/>
+                <a16:creationId xmlns:a16="http://schemas.microsoft.com/office/drawing/2014/main" id="{51039EB4-10B5-4D23-8B63-B96099EEE169}"/>
               </a:ext>
             </a:extLst>
           </p:cNvPr>
@@ -538,7 +549,7 @@
           <p:cNvPr id="3" name="Untertitel 2">
             <a:extLst>
               <a:ext uri="{FF2B5EF4-FFF2-40B4-BE49-F238E27FC236}">
-                <a16:creationId xmlns:a16="http://schemas.microsoft.com/office/drawing/2014/main" xmlns="" id="{0050E34C-7E70-4491-A89C-CA8BCA660B07}"/>
+                <a16:creationId xmlns:a16="http://schemas.microsoft.com/office/drawing/2014/main" id="{0050E34C-7E70-4491-A89C-CA8BCA660B07}"/>
               </a:ext>
             </a:extLst>
           </p:cNvPr>
@@ -609,7 +620,7 @@
           <p:cNvPr id="4" name="Datumsplatzhalter 3">
             <a:extLst>
               <a:ext uri="{FF2B5EF4-FFF2-40B4-BE49-F238E27FC236}">
-                <a16:creationId xmlns:a16="http://schemas.microsoft.com/office/drawing/2014/main" xmlns="" id="{B28B1115-597E-48DA-B23E-83F9FB35C2AA}"/>
+                <a16:creationId xmlns:a16="http://schemas.microsoft.com/office/drawing/2014/main" id="{B28B1115-597E-48DA-B23E-83F9FB35C2AA}"/>
               </a:ext>
             </a:extLst>
           </p:cNvPr>
@@ -639,7 +650,7 @@
           <p:cNvPr id="5" name="Fußzeilenplatzhalter 4">
             <a:extLst>
               <a:ext uri="{FF2B5EF4-FFF2-40B4-BE49-F238E27FC236}">
-                <a16:creationId xmlns:a16="http://schemas.microsoft.com/office/drawing/2014/main" xmlns="" id="{F35E7489-51A8-43C5-8B78-2B792E9B367D}"/>
+                <a16:creationId xmlns:a16="http://schemas.microsoft.com/office/drawing/2014/main" id="{F35E7489-51A8-43C5-8B78-2B792E9B367D}"/>
               </a:ext>
             </a:extLst>
           </p:cNvPr>
@@ -667,7 +678,7 @@
           <p:cNvPr id="6" name="Foliennummernplatzhalter 5">
             <a:extLst>
               <a:ext uri="{FF2B5EF4-FFF2-40B4-BE49-F238E27FC236}">
-                <a16:creationId xmlns:a16="http://schemas.microsoft.com/office/drawing/2014/main" xmlns="" id="{1EE54DBE-7C61-4F68-B48A-161E940BCE43}"/>
+                <a16:creationId xmlns:a16="http://schemas.microsoft.com/office/drawing/2014/main" id="{1EE54DBE-7C61-4F68-B48A-161E940BCE43}"/>
               </a:ext>
             </a:extLst>
           </p:cNvPr>
@@ -695,7 +706,7 @@
     </p:spTree>
     <p:extLst>
       <p:ext uri="{BB962C8B-B14F-4D97-AF65-F5344CB8AC3E}">
-        <p14:creationId xmlns:p14="http://schemas.microsoft.com/office/powerpoint/2010/main" xmlns="" val="647135209"/>
+        <p14:creationId xmlns:p14="http://schemas.microsoft.com/office/powerpoint/2010/main" val="647135209"/>
       </p:ext>
     </p:extLst>
   </p:cSld>
@@ -727,7 +738,7 @@
           <p:cNvPr id="2" name="Titel 1">
             <a:extLst>
               <a:ext uri="{FF2B5EF4-FFF2-40B4-BE49-F238E27FC236}">
-                <a16:creationId xmlns:a16="http://schemas.microsoft.com/office/drawing/2014/main" xmlns="" id="{2E6702C5-9E2B-4970-A51F-9D85FD1FD93A}"/>
+                <a16:creationId xmlns:a16="http://schemas.microsoft.com/office/drawing/2014/main" id="{2E6702C5-9E2B-4970-A51F-9D85FD1FD93A}"/>
               </a:ext>
             </a:extLst>
           </p:cNvPr>
@@ -756,7 +767,7 @@
           <p:cNvPr id="3" name="Vertikaler Textplatzhalter 2">
             <a:extLst>
               <a:ext uri="{FF2B5EF4-FFF2-40B4-BE49-F238E27FC236}">
-                <a16:creationId xmlns:a16="http://schemas.microsoft.com/office/drawing/2014/main" xmlns="" id="{5F7EAE25-45D1-4ECC-ABBD-B2A5EBB74440}"/>
+                <a16:creationId xmlns:a16="http://schemas.microsoft.com/office/drawing/2014/main" id="{5F7EAE25-45D1-4ECC-ABBD-B2A5EBB74440}"/>
               </a:ext>
             </a:extLst>
           </p:cNvPr>
@@ -814,7 +825,7 @@
           <p:cNvPr id="4" name="Datumsplatzhalter 3">
             <a:extLst>
               <a:ext uri="{FF2B5EF4-FFF2-40B4-BE49-F238E27FC236}">
-                <a16:creationId xmlns:a16="http://schemas.microsoft.com/office/drawing/2014/main" xmlns="" id="{417433EA-9B06-42BF-8F27-BAE2F9DBE366}"/>
+                <a16:creationId xmlns:a16="http://schemas.microsoft.com/office/drawing/2014/main" id="{417433EA-9B06-42BF-8F27-BAE2F9DBE366}"/>
               </a:ext>
             </a:extLst>
           </p:cNvPr>
@@ -844,7 +855,7 @@
           <p:cNvPr id="5" name="Fußzeilenplatzhalter 4">
             <a:extLst>
               <a:ext uri="{FF2B5EF4-FFF2-40B4-BE49-F238E27FC236}">
-                <a16:creationId xmlns:a16="http://schemas.microsoft.com/office/drawing/2014/main" xmlns="" id="{7F96B7F6-96BD-4279-81A9-3EDC08E1D7C8}"/>
+                <a16:creationId xmlns:a16="http://schemas.microsoft.com/office/drawing/2014/main" id="{7F96B7F6-96BD-4279-81A9-3EDC08E1D7C8}"/>
               </a:ext>
             </a:extLst>
           </p:cNvPr>
@@ -872,7 +883,7 @@
           <p:cNvPr id="6" name="Foliennummernplatzhalter 5">
             <a:extLst>
               <a:ext uri="{FF2B5EF4-FFF2-40B4-BE49-F238E27FC236}">
-                <a16:creationId xmlns:a16="http://schemas.microsoft.com/office/drawing/2014/main" xmlns="" id="{0CE676B7-9D2A-4340-AA28-01883E831446}"/>
+                <a16:creationId xmlns:a16="http://schemas.microsoft.com/office/drawing/2014/main" id="{0CE676B7-9D2A-4340-AA28-01883E831446}"/>
               </a:ext>
             </a:extLst>
           </p:cNvPr>
@@ -900,7 +911,7 @@
     </p:spTree>
     <p:extLst>
       <p:ext uri="{BB962C8B-B14F-4D97-AF65-F5344CB8AC3E}">
-        <p14:creationId xmlns:p14="http://schemas.microsoft.com/office/powerpoint/2010/main" xmlns="" val="856005953"/>
+        <p14:creationId xmlns:p14="http://schemas.microsoft.com/office/powerpoint/2010/main" val="856005953"/>
       </p:ext>
     </p:extLst>
   </p:cSld>
@@ -932,7 +943,7 @@
           <p:cNvPr id="2" name="Vertikaler Titel 1">
             <a:extLst>
               <a:ext uri="{FF2B5EF4-FFF2-40B4-BE49-F238E27FC236}">
-                <a16:creationId xmlns:a16="http://schemas.microsoft.com/office/drawing/2014/main" xmlns="" id="{C2EC8427-F02B-471C-BE9F-54BE7FED3E88}"/>
+                <a16:creationId xmlns:a16="http://schemas.microsoft.com/office/drawing/2014/main" id="{C2EC8427-F02B-471C-BE9F-54BE7FED3E88}"/>
               </a:ext>
             </a:extLst>
           </p:cNvPr>
@@ -966,7 +977,7 @@
           <p:cNvPr id="3" name="Vertikaler Textplatzhalter 2">
             <a:extLst>
               <a:ext uri="{FF2B5EF4-FFF2-40B4-BE49-F238E27FC236}">
-                <a16:creationId xmlns:a16="http://schemas.microsoft.com/office/drawing/2014/main" xmlns="" id="{DCB5733F-4BB1-4548-B31F-AFFA9E227B93}"/>
+                <a16:creationId xmlns:a16="http://schemas.microsoft.com/office/drawing/2014/main" id="{DCB5733F-4BB1-4548-B31F-AFFA9E227B93}"/>
               </a:ext>
             </a:extLst>
           </p:cNvPr>
@@ -1029,7 +1040,7 @@
           <p:cNvPr id="4" name="Datumsplatzhalter 3">
             <a:extLst>
               <a:ext uri="{FF2B5EF4-FFF2-40B4-BE49-F238E27FC236}">
-                <a16:creationId xmlns:a16="http://schemas.microsoft.com/office/drawing/2014/main" xmlns="" id="{4134AF7B-E7AE-4985-B4D5-AB463B686834}"/>
+                <a16:creationId xmlns:a16="http://schemas.microsoft.com/office/drawing/2014/main" id="{4134AF7B-E7AE-4985-B4D5-AB463B686834}"/>
               </a:ext>
             </a:extLst>
           </p:cNvPr>
@@ -1059,7 +1070,7 @@
           <p:cNvPr id="5" name="Fußzeilenplatzhalter 4">
             <a:extLst>
               <a:ext uri="{FF2B5EF4-FFF2-40B4-BE49-F238E27FC236}">
-                <a16:creationId xmlns:a16="http://schemas.microsoft.com/office/drawing/2014/main" xmlns="" id="{DDF6A07D-F341-4F1A-A0C4-0C3CD837A5EC}"/>
+                <a16:creationId xmlns:a16="http://schemas.microsoft.com/office/drawing/2014/main" id="{DDF6A07D-F341-4F1A-A0C4-0C3CD837A5EC}"/>
               </a:ext>
             </a:extLst>
           </p:cNvPr>
@@ -1087,7 +1098,7 @@
           <p:cNvPr id="6" name="Foliennummernplatzhalter 5">
             <a:extLst>
               <a:ext uri="{FF2B5EF4-FFF2-40B4-BE49-F238E27FC236}">
-                <a16:creationId xmlns:a16="http://schemas.microsoft.com/office/drawing/2014/main" xmlns="" id="{C963A820-7179-49B8-9C24-C900DCAD22DF}"/>
+                <a16:creationId xmlns:a16="http://schemas.microsoft.com/office/drawing/2014/main" id="{C963A820-7179-49B8-9C24-C900DCAD22DF}"/>
               </a:ext>
             </a:extLst>
           </p:cNvPr>
@@ -1115,7 +1126,7 @@
     </p:spTree>
     <p:extLst>
       <p:ext uri="{BB962C8B-B14F-4D97-AF65-F5344CB8AC3E}">
-        <p14:creationId xmlns:p14="http://schemas.microsoft.com/office/powerpoint/2010/main" xmlns="" val="3125982732"/>
+        <p14:creationId xmlns:p14="http://schemas.microsoft.com/office/powerpoint/2010/main" val="3125982732"/>
       </p:ext>
     </p:extLst>
   </p:cSld>
@@ -1147,7 +1158,7 @@
           <p:cNvPr id="2" name="Titel 1">
             <a:extLst>
               <a:ext uri="{FF2B5EF4-FFF2-40B4-BE49-F238E27FC236}">
-                <a16:creationId xmlns:a16="http://schemas.microsoft.com/office/drawing/2014/main" xmlns="" id="{3C603BDC-3AFE-45A6-B06E-FFEC1D03B29C}"/>
+                <a16:creationId xmlns:a16="http://schemas.microsoft.com/office/drawing/2014/main" id="{3C603BDC-3AFE-45A6-B06E-FFEC1D03B29C}"/>
               </a:ext>
             </a:extLst>
           </p:cNvPr>
@@ -1176,7 +1187,7 @@
           <p:cNvPr id="3" name="Inhaltsplatzhalter 2">
             <a:extLst>
               <a:ext uri="{FF2B5EF4-FFF2-40B4-BE49-F238E27FC236}">
-                <a16:creationId xmlns:a16="http://schemas.microsoft.com/office/drawing/2014/main" xmlns="" id="{EDC8BB13-7128-4D1F-AE63-FBB788BFC11C}"/>
+                <a16:creationId xmlns:a16="http://schemas.microsoft.com/office/drawing/2014/main" id="{EDC8BB13-7128-4D1F-AE63-FBB788BFC11C}"/>
               </a:ext>
             </a:extLst>
           </p:cNvPr>
@@ -1234,7 +1245,7 @@
           <p:cNvPr id="4" name="Datumsplatzhalter 3">
             <a:extLst>
               <a:ext uri="{FF2B5EF4-FFF2-40B4-BE49-F238E27FC236}">
-                <a16:creationId xmlns:a16="http://schemas.microsoft.com/office/drawing/2014/main" xmlns="" id="{B839BF74-FD3C-488F-8DED-4B50D2CA320E}"/>
+                <a16:creationId xmlns:a16="http://schemas.microsoft.com/office/drawing/2014/main" id="{B839BF74-FD3C-488F-8DED-4B50D2CA320E}"/>
               </a:ext>
             </a:extLst>
           </p:cNvPr>
@@ -1264,7 +1275,7 @@
           <p:cNvPr id="5" name="Fußzeilenplatzhalter 4">
             <a:extLst>
               <a:ext uri="{FF2B5EF4-FFF2-40B4-BE49-F238E27FC236}">
-                <a16:creationId xmlns:a16="http://schemas.microsoft.com/office/drawing/2014/main" xmlns="" id="{1D8953A5-284A-408F-84B9-06172903FA9D}"/>
+                <a16:creationId xmlns:a16="http://schemas.microsoft.com/office/drawing/2014/main" id="{1D8953A5-284A-408F-84B9-06172903FA9D}"/>
               </a:ext>
             </a:extLst>
           </p:cNvPr>
@@ -1292,7 +1303,7 @@
           <p:cNvPr id="6" name="Foliennummernplatzhalter 5">
             <a:extLst>
               <a:ext uri="{FF2B5EF4-FFF2-40B4-BE49-F238E27FC236}">
-                <a16:creationId xmlns:a16="http://schemas.microsoft.com/office/drawing/2014/main" xmlns="" id="{20E9DDEF-9A8B-4DE8-90B0-BBF4D7A74871}"/>
+                <a16:creationId xmlns:a16="http://schemas.microsoft.com/office/drawing/2014/main" id="{20E9DDEF-9A8B-4DE8-90B0-BBF4D7A74871}"/>
               </a:ext>
             </a:extLst>
           </p:cNvPr>
@@ -1322,7 +1333,7 @@
           <p:cNvPr id="7" name="Picture 2" descr="Ameise, Schwarze Ameise, Natur, Animalia, Tierwelt">
             <a:extLst>
               <a:ext uri="{FF2B5EF4-FFF2-40B4-BE49-F238E27FC236}">
-                <a16:creationId xmlns:a16="http://schemas.microsoft.com/office/drawing/2014/main" xmlns="" id="{72482A91-B0DF-4FC5-B778-4EA22B0F2702}"/>
+                <a16:creationId xmlns:a16="http://schemas.microsoft.com/office/drawing/2014/main" id="{72482A91-B0DF-4FC5-B778-4EA22B0F2702}"/>
               </a:ext>
             </a:extLst>
           </p:cNvPr>
@@ -1336,7 +1347,7 @@
             <a:alphaModFix/>
             <a:extLst>
               <a:ext uri="{28A0092B-C50C-407E-A947-70E740481C1C}">
-                <a14:useLocalDpi xmlns:a14="http://schemas.microsoft.com/office/drawing/2010/main" xmlns="" val="0"/>
+                <a14:useLocalDpi xmlns:a14="http://schemas.microsoft.com/office/drawing/2010/main" val="0"/>
               </a:ext>
             </a:extLst>
           </a:blip>
@@ -1359,7 +1370,7 @@
           </a:effectLst>
           <a:extLst>
             <a:ext uri="{909E8E84-426E-40DD-AFC4-6F175D3DCCD1}">
-              <a14:hiddenFill xmlns:a14="http://schemas.microsoft.com/office/drawing/2010/main" xmlns="">
+              <a14:hiddenFill xmlns:a14="http://schemas.microsoft.com/office/drawing/2010/main">
                 <a:solidFill>
                   <a:srgbClr val="FFFFFF"/>
                 </a:solidFill>
@@ -1371,7 +1382,7 @@
     </p:spTree>
     <p:extLst>
       <p:ext uri="{BB962C8B-B14F-4D97-AF65-F5344CB8AC3E}">
-        <p14:creationId xmlns:p14="http://schemas.microsoft.com/office/powerpoint/2010/main" xmlns="" val="1894972969"/>
+        <p14:creationId xmlns:p14="http://schemas.microsoft.com/office/powerpoint/2010/main" val="1894972969"/>
       </p:ext>
     </p:extLst>
   </p:cSld>
@@ -1403,7 +1414,7 @@
           <p:cNvPr id="2" name="Titel 1">
             <a:extLst>
               <a:ext uri="{FF2B5EF4-FFF2-40B4-BE49-F238E27FC236}">
-                <a16:creationId xmlns:a16="http://schemas.microsoft.com/office/drawing/2014/main" xmlns="" id="{2E4FEDA9-2A58-431F-BCF5-7A5E80AAF84E}"/>
+                <a16:creationId xmlns:a16="http://schemas.microsoft.com/office/drawing/2014/main" id="{2E4FEDA9-2A58-431F-BCF5-7A5E80AAF84E}"/>
               </a:ext>
             </a:extLst>
           </p:cNvPr>
@@ -1441,7 +1452,7 @@
           <p:cNvPr id="3" name="Textplatzhalter 2">
             <a:extLst>
               <a:ext uri="{FF2B5EF4-FFF2-40B4-BE49-F238E27FC236}">
-                <a16:creationId xmlns:a16="http://schemas.microsoft.com/office/drawing/2014/main" xmlns="" id="{877F47A7-9A27-41A0-A4A7-069A78712996}"/>
+                <a16:creationId xmlns:a16="http://schemas.microsoft.com/office/drawing/2014/main" id="{877F47A7-9A27-41A0-A4A7-069A78712996}"/>
               </a:ext>
             </a:extLst>
           </p:cNvPr>
@@ -1566,7 +1577,7 @@
           <p:cNvPr id="4" name="Datumsplatzhalter 3">
             <a:extLst>
               <a:ext uri="{FF2B5EF4-FFF2-40B4-BE49-F238E27FC236}">
-                <a16:creationId xmlns:a16="http://schemas.microsoft.com/office/drawing/2014/main" xmlns="" id="{572DAB82-29DC-4CF7-B00B-D7C7D5124F51}"/>
+                <a16:creationId xmlns:a16="http://schemas.microsoft.com/office/drawing/2014/main" id="{572DAB82-29DC-4CF7-B00B-D7C7D5124F51}"/>
               </a:ext>
             </a:extLst>
           </p:cNvPr>
@@ -1596,7 +1607,7 @@
           <p:cNvPr id="5" name="Fußzeilenplatzhalter 4">
             <a:extLst>
               <a:ext uri="{FF2B5EF4-FFF2-40B4-BE49-F238E27FC236}">
-                <a16:creationId xmlns:a16="http://schemas.microsoft.com/office/drawing/2014/main" xmlns="" id="{42A3A0A2-EDD4-4113-845A-5DB379556664}"/>
+                <a16:creationId xmlns:a16="http://schemas.microsoft.com/office/drawing/2014/main" id="{42A3A0A2-EDD4-4113-845A-5DB379556664}"/>
               </a:ext>
             </a:extLst>
           </p:cNvPr>
@@ -1624,7 +1635,7 @@
           <p:cNvPr id="6" name="Foliennummernplatzhalter 5">
             <a:extLst>
               <a:ext uri="{FF2B5EF4-FFF2-40B4-BE49-F238E27FC236}">
-                <a16:creationId xmlns:a16="http://schemas.microsoft.com/office/drawing/2014/main" xmlns="" id="{79EE7E90-4D67-4F27-932A-7514B19120FE}"/>
+                <a16:creationId xmlns:a16="http://schemas.microsoft.com/office/drawing/2014/main" id="{79EE7E90-4D67-4F27-932A-7514B19120FE}"/>
               </a:ext>
             </a:extLst>
           </p:cNvPr>
@@ -1652,7 +1663,7 @@
     </p:spTree>
     <p:extLst>
       <p:ext uri="{BB962C8B-B14F-4D97-AF65-F5344CB8AC3E}">
-        <p14:creationId xmlns:p14="http://schemas.microsoft.com/office/powerpoint/2010/main" xmlns="" val="903159024"/>
+        <p14:creationId xmlns:p14="http://schemas.microsoft.com/office/powerpoint/2010/main" val="903159024"/>
       </p:ext>
     </p:extLst>
   </p:cSld>
@@ -1684,7 +1695,7 @@
           <p:cNvPr id="2" name="Titel 1">
             <a:extLst>
               <a:ext uri="{FF2B5EF4-FFF2-40B4-BE49-F238E27FC236}">
-                <a16:creationId xmlns:a16="http://schemas.microsoft.com/office/drawing/2014/main" xmlns="" id="{CF0B904A-DDC7-4A7A-9E06-D58C35895AF6}"/>
+                <a16:creationId xmlns:a16="http://schemas.microsoft.com/office/drawing/2014/main" id="{CF0B904A-DDC7-4A7A-9E06-D58C35895AF6}"/>
               </a:ext>
             </a:extLst>
           </p:cNvPr>
@@ -1713,7 +1724,7 @@
           <p:cNvPr id="3" name="Inhaltsplatzhalter 2">
             <a:extLst>
               <a:ext uri="{FF2B5EF4-FFF2-40B4-BE49-F238E27FC236}">
-                <a16:creationId xmlns:a16="http://schemas.microsoft.com/office/drawing/2014/main" xmlns="" id="{5F46D2F8-DDDD-4464-8534-FC1FCC37D6F5}"/>
+                <a16:creationId xmlns:a16="http://schemas.microsoft.com/office/drawing/2014/main" id="{5F46D2F8-DDDD-4464-8534-FC1FCC37D6F5}"/>
               </a:ext>
             </a:extLst>
           </p:cNvPr>
@@ -1776,7 +1787,7 @@
           <p:cNvPr id="4" name="Inhaltsplatzhalter 3">
             <a:extLst>
               <a:ext uri="{FF2B5EF4-FFF2-40B4-BE49-F238E27FC236}">
-                <a16:creationId xmlns:a16="http://schemas.microsoft.com/office/drawing/2014/main" xmlns="" id="{D4C08BB8-EC4A-45B0-B68C-6980F8719383}"/>
+                <a16:creationId xmlns:a16="http://schemas.microsoft.com/office/drawing/2014/main" id="{D4C08BB8-EC4A-45B0-B68C-6980F8719383}"/>
               </a:ext>
             </a:extLst>
           </p:cNvPr>
@@ -1839,7 +1850,7 @@
           <p:cNvPr id="5" name="Datumsplatzhalter 4">
             <a:extLst>
               <a:ext uri="{FF2B5EF4-FFF2-40B4-BE49-F238E27FC236}">
-                <a16:creationId xmlns:a16="http://schemas.microsoft.com/office/drawing/2014/main" xmlns="" id="{5AA54652-16B7-4FC4-A951-47A3C37AEC21}"/>
+                <a16:creationId xmlns:a16="http://schemas.microsoft.com/office/drawing/2014/main" id="{5AA54652-16B7-4FC4-A951-47A3C37AEC21}"/>
               </a:ext>
             </a:extLst>
           </p:cNvPr>
@@ -1869,7 +1880,7 @@
           <p:cNvPr id="6" name="Fußzeilenplatzhalter 5">
             <a:extLst>
               <a:ext uri="{FF2B5EF4-FFF2-40B4-BE49-F238E27FC236}">
-                <a16:creationId xmlns:a16="http://schemas.microsoft.com/office/drawing/2014/main" xmlns="" id="{77302530-C86D-49A2-B2E5-A0ABF29B7F70}"/>
+                <a16:creationId xmlns:a16="http://schemas.microsoft.com/office/drawing/2014/main" id="{77302530-C86D-49A2-B2E5-A0ABF29B7F70}"/>
               </a:ext>
             </a:extLst>
           </p:cNvPr>
@@ -1897,7 +1908,7 @@
           <p:cNvPr id="7" name="Foliennummernplatzhalter 6">
             <a:extLst>
               <a:ext uri="{FF2B5EF4-FFF2-40B4-BE49-F238E27FC236}">
-                <a16:creationId xmlns:a16="http://schemas.microsoft.com/office/drawing/2014/main" xmlns="" id="{FF823619-31C6-42A6-9465-CFB677BBB04F}"/>
+                <a16:creationId xmlns:a16="http://schemas.microsoft.com/office/drawing/2014/main" id="{FF823619-31C6-42A6-9465-CFB677BBB04F}"/>
               </a:ext>
             </a:extLst>
           </p:cNvPr>
@@ -1925,7 +1936,7 @@
     </p:spTree>
     <p:extLst>
       <p:ext uri="{BB962C8B-B14F-4D97-AF65-F5344CB8AC3E}">
-        <p14:creationId xmlns:p14="http://schemas.microsoft.com/office/powerpoint/2010/main" xmlns="" val="3170170722"/>
+        <p14:creationId xmlns:p14="http://schemas.microsoft.com/office/powerpoint/2010/main" val="3170170722"/>
       </p:ext>
     </p:extLst>
   </p:cSld>
@@ -1957,7 +1968,7 @@
           <p:cNvPr id="2" name="Titel 1">
             <a:extLst>
               <a:ext uri="{FF2B5EF4-FFF2-40B4-BE49-F238E27FC236}">
-                <a16:creationId xmlns:a16="http://schemas.microsoft.com/office/drawing/2014/main" xmlns="" id="{5107679D-52A7-43D0-8FB3-DB3A663CFB10}"/>
+                <a16:creationId xmlns:a16="http://schemas.microsoft.com/office/drawing/2014/main" id="{5107679D-52A7-43D0-8FB3-DB3A663CFB10}"/>
               </a:ext>
             </a:extLst>
           </p:cNvPr>
@@ -1991,7 +2002,7 @@
           <p:cNvPr id="3" name="Textplatzhalter 2">
             <a:extLst>
               <a:ext uri="{FF2B5EF4-FFF2-40B4-BE49-F238E27FC236}">
-                <a16:creationId xmlns:a16="http://schemas.microsoft.com/office/drawing/2014/main" xmlns="" id="{7A260E6F-7073-43DD-BBAB-D218C03C6D9F}"/>
+                <a16:creationId xmlns:a16="http://schemas.microsoft.com/office/drawing/2014/main" id="{7A260E6F-7073-43DD-BBAB-D218C03C6D9F}"/>
               </a:ext>
             </a:extLst>
           </p:cNvPr>
@@ -2062,7 +2073,7 @@
           <p:cNvPr id="4" name="Inhaltsplatzhalter 3">
             <a:extLst>
               <a:ext uri="{FF2B5EF4-FFF2-40B4-BE49-F238E27FC236}">
-                <a16:creationId xmlns:a16="http://schemas.microsoft.com/office/drawing/2014/main" xmlns="" id="{DDA3492C-946E-43D1-BC2D-97A7951A5F73}"/>
+                <a16:creationId xmlns:a16="http://schemas.microsoft.com/office/drawing/2014/main" id="{DDA3492C-946E-43D1-BC2D-97A7951A5F73}"/>
               </a:ext>
             </a:extLst>
           </p:cNvPr>
@@ -2125,7 +2136,7 @@
           <p:cNvPr id="5" name="Textplatzhalter 4">
             <a:extLst>
               <a:ext uri="{FF2B5EF4-FFF2-40B4-BE49-F238E27FC236}">
-                <a16:creationId xmlns:a16="http://schemas.microsoft.com/office/drawing/2014/main" xmlns="" id="{737A96B9-BF3F-4E1F-AA31-BB448AAC6DA7}"/>
+                <a16:creationId xmlns:a16="http://schemas.microsoft.com/office/drawing/2014/main" id="{737A96B9-BF3F-4E1F-AA31-BB448AAC6DA7}"/>
               </a:ext>
             </a:extLst>
           </p:cNvPr>
@@ -2196,7 +2207,7 @@
           <p:cNvPr id="6" name="Inhaltsplatzhalter 5">
             <a:extLst>
               <a:ext uri="{FF2B5EF4-FFF2-40B4-BE49-F238E27FC236}">
-                <a16:creationId xmlns:a16="http://schemas.microsoft.com/office/drawing/2014/main" xmlns="" id="{26B397B1-202F-44A9-A21F-87242EEDD055}"/>
+                <a16:creationId xmlns:a16="http://schemas.microsoft.com/office/drawing/2014/main" id="{26B397B1-202F-44A9-A21F-87242EEDD055}"/>
               </a:ext>
             </a:extLst>
           </p:cNvPr>
@@ -2259,7 +2270,7 @@
           <p:cNvPr id="7" name="Datumsplatzhalter 6">
             <a:extLst>
               <a:ext uri="{FF2B5EF4-FFF2-40B4-BE49-F238E27FC236}">
-                <a16:creationId xmlns:a16="http://schemas.microsoft.com/office/drawing/2014/main" xmlns="" id="{F8A17590-259A-40AE-9A1A-B16C6FC79E9E}"/>
+                <a16:creationId xmlns:a16="http://schemas.microsoft.com/office/drawing/2014/main" id="{F8A17590-259A-40AE-9A1A-B16C6FC79E9E}"/>
               </a:ext>
             </a:extLst>
           </p:cNvPr>
@@ -2289,7 +2300,7 @@
           <p:cNvPr id="8" name="Fußzeilenplatzhalter 7">
             <a:extLst>
               <a:ext uri="{FF2B5EF4-FFF2-40B4-BE49-F238E27FC236}">
-                <a16:creationId xmlns:a16="http://schemas.microsoft.com/office/drawing/2014/main" xmlns="" id="{4287D123-5809-468C-8B67-083C99BD0A0B}"/>
+                <a16:creationId xmlns:a16="http://schemas.microsoft.com/office/drawing/2014/main" id="{4287D123-5809-468C-8B67-083C99BD0A0B}"/>
               </a:ext>
             </a:extLst>
           </p:cNvPr>
@@ -2317,7 +2328,7 @@
           <p:cNvPr id="9" name="Foliennummernplatzhalter 8">
             <a:extLst>
               <a:ext uri="{FF2B5EF4-FFF2-40B4-BE49-F238E27FC236}">
-                <a16:creationId xmlns:a16="http://schemas.microsoft.com/office/drawing/2014/main" xmlns="" id="{61AF3701-764D-4D9A-A220-DBF9BA7822C0}"/>
+                <a16:creationId xmlns:a16="http://schemas.microsoft.com/office/drawing/2014/main" id="{61AF3701-764D-4D9A-A220-DBF9BA7822C0}"/>
               </a:ext>
             </a:extLst>
           </p:cNvPr>
@@ -2345,7 +2356,7 @@
     </p:spTree>
     <p:extLst>
       <p:ext uri="{BB962C8B-B14F-4D97-AF65-F5344CB8AC3E}">
-        <p14:creationId xmlns:p14="http://schemas.microsoft.com/office/powerpoint/2010/main" xmlns="" val="814091560"/>
+        <p14:creationId xmlns:p14="http://schemas.microsoft.com/office/powerpoint/2010/main" val="814091560"/>
       </p:ext>
     </p:extLst>
   </p:cSld>
@@ -2377,7 +2388,7 @@
           <p:cNvPr id="2" name="Titel 1">
             <a:extLst>
               <a:ext uri="{FF2B5EF4-FFF2-40B4-BE49-F238E27FC236}">
-                <a16:creationId xmlns:a16="http://schemas.microsoft.com/office/drawing/2014/main" xmlns="" id="{2AD75BE5-0CA2-4462-81A3-CE0067B1A775}"/>
+                <a16:creationId xmlns:a16="http://schemas.microsoft.com/office/drawing/2014/main" id="{2AD75BE5-0CA2-4462-81A3-CE0067B1A775}"/>
               </a:ext>
             </a:extLst>
           </p:cNvPr>
@@ -2406,7 +2417,7 @@
           <p:cNvPr id="3" name="Datumsplatzhalter 2">
             <a:extLst>
               <a:ext uri="{FF2B5EF4-FFF2-40B4-BE49-F238E27FC236}">
-                <a16:creationId xmlns:a16="http://schemas.microsoft.com/office/drawing/2014/main" xmlns="" id="{D401482F-21CF-4AD8-B533-708F48242AB6}"/>
+                <a16:creationId xmlns:a16="http://schemas.microsoft.com/office/drawing/2014/main" id="{D401482F-21CF-4AD8-B533-708F48242AB6}"/>
               </a:ext>
             </a:extLst>
           </p:cNvPr>
@@ -2436,7 +2447,7 @@
           <p:cNvPr id="4" name="Fußzeilenplatzhalter 3">
             <a:extLst>
               <a:ext uri="{FF2B5EF4-FFF2-40B4-BE49-F238E27FC236}">
-                <a16:creationId xmlns:a16="http://schemas.microsoft.com/office/drawing/2014/main" xmlns="" id="{C79EA6D6-C056-4317-8686-A1168F7AA2AE}"/>
+                <a16:creationId xmlns:a16="http://schemas.microsoft.com/office/drawing/2014/main" id="{C79EA6D6-C056-4317-8686-A1168F7AA2AE}"/>
               </a:ext>
             </a:extLst>
           </p:cNvPr>
@@ -2464,7 +2475,7 @@
           <p:cNvPr id="5" name="Foliennummernplatzhalter 4">
             <a:extLst>
               <a:ext uri="{FF2B5EF4-FFF2-40B4-BE49-F238E27FC236}">
-                <a16:creationId xmlns:a16="http://schemas.microsoft.com/office/drawing/2014/main" xmlns="" id="{17460923-92CC-448F-A03F-FF86BB600519}"/>
+                <a16:creationId xmlns:a16="http://schemas.microsoft.com/office/drawing/2014/main" id="{17460923-92CC-448F-A03F-FF86BB600519}"/>
               </a:ext>
             </a:extLst>
           </p:cNvPr>
@@ -2492,7 +2503,7 @@
     </p:spTree>
     <p:extLst>
       <p:ext uri="{BB962C8B-B14F-4D97-AF65-F5344CB8AC3E}">
-        <p14:creationId xmlns:p14="http://schemas.microsoft.com/office/powerpoint/2010/main" xmlns="" val="2350845020"/>
+        <p14:creationId xmlns:p14="http://schemas.microsoft.com/office/powerpoint/2010/main" val="2350845020"/>
       </p:ext>
     </p:extLst>
   </p:cSld>
@@ -2524,7 +2535,7 @@
           <p:cNvPr id="2" name="Datumsplatzhalter 1">
             <a:extLst>
               <a:ext uri="{FF2B5EF4-FFF2-40B4-BE49-F238E27FC236}">
-                <a16:creationId xmlns:a16="http://schemas.microsoft.com/office/drawing/2014/main" xmlns="" id="{F4B77A0D-5A16-44AB-BC84-F463ADCC2B40}"/>
+                <a16:creationId xmlns:a16="http://schemas.microsoft.com/office/drawing/2014/main" id="{F4B77A0D-5A16-44AB-BC84-F463ADCC2B40}"/>
               </a:ext>
             </a:extLst>
           </p:cNvPr>
@@ -2554,7 +2565,7 @@
           <p:cNvPr id="3" name="Fußzeilenplatzhalter 2">
             <a:extLst>
               <a:ext uri="{FF2B5EF4-FFF2-40B4-BE49-F238E27FC236}">
-                <a16:creationId xmlns:a16="http://schemas.microsoft.com/office/drawing/2014/main" xmlns="" id="{E6884803-ACC4-43DD-B928-6D58D548090E}"/>
+                <a16:creationId xmlns:a16="http://schemas.microsoft.com/office/drawing/2014/main" id="{E6884803-ACC4-43DD-B928-6D58D548090E}"/>
               </a:ext>
             </a:extLst>
           </p:cNvPr>
@@ -2582,7 +2593,7 @@
           <p:cNvPr id="4" name="Foliennummernplatzhalter 3">
             <a:extLst>
               <a:ext uri="{FF2B5EF4-FFF2-40B4-BE49-F238E27FC236}">
-                <a16:creationId xmlns:a16="http://schemas.microsoft.com/office/drawing/2014/main" xmlns="" id="{170327F9-76C1-443C-9D81-1A5ACE9231C6}"/>
+                <a16:creationId xmlns:a16="http://schemas.microsoft.com/office/drawing/2014/main" id="{170327F9-76C1-443C-9D81-1A5ACE9231C6}"/>
               </a:ext>
             </a:extLst>
           </p:cNvPr>
@@ -2610,7 +2621,7 @@
     </p:spTree>
     <p:extLst>
       <p:ext uri="{BB962C8B-B14F-4D97-AF65-F5344CB8AC3E}">
-        <p14:creationId xmlns:p14="http://schemas.microsoft.com/office/powerpoint/2010/main" xmlns="" val="4237047602"/>
+        <p14:creationId xmlns:p14="http://schemas.microsoft.com/office/powerpoint/2010/main" val="4237047602"/>
       </p:ext>
     </p:extLst>
   </p:cSld>
@@ -2642,7 +2653,7 @@
           <p:cNvPr id="2" name="Titel 1">
             <a:extLst>
               <a:ext uri="{FF2B5EF4-FFF2-40B4-BE49-F238E27FC236}">
-                <a16:creationId xmlns:a16="http://schemas.microsoft.com/office/drawing/2014/main" xmlns="" id="{4104CA0F-3E04-4B0D-B37D-7CD6602FEBCA}"/>
+                <a16:creationId xmlns:a16="http://schemas.microsoft.com/office/drawing/2014/main" id="{4104CA0F-3E04-4B0D-B37D-7CD6602FEBCA}"/>
               </a:ext>
             </a:extLst>
           </p:cNvPr>
@@ -2680,7 +2691,7 @@
           <p:cNvPr id="3" name="Inhaltsplatzhalter 2">
             <a:extLst>
               <a:ext uri="{FF2B5EF4-FFF2-40B4-BE49-F238E27FC236}">
-                <a16:creationId xmlns:a16="http://schemas.microsoft.com/office/drawing/2014/main" xmlns="" id="{A5358404-4DDB-4140-8852-F84F37AF47B2}"/>
+                <a16:creationId xmlns:a16="http://schemas.microsoft.com/office/drawing/2014/main" id="{A5358404-4DDB-4140-8852-F84F37AF47B2}"/>
               </a:ext>
             </a:extLst>
           </p:cNvPr>
@@ -2771,7 +2782,7 @@
           <p:cNvPr id="4" name="Textplatzhalter 3">
             <a:extLst>
               <a:ext uri="{FF2B5EF4-FFF2-40B4-BE49-F238E27FC236}">
-                <a16:creationId xmlns:a16="http://schemas.microsoft.com/office/drawing/2014/main" xmlns="" id="{64AF744F-5860-450D-835D-215EFF8E3AC4}"/>
+                <a16:creationId xmlns:a16="http://schemas.microsoft.com/office/drawing/2014/main" id="{64AF744F-5860-450D-835D-215EFF8E3AC4}"/>
               </a:ext>
             </a:extLst>
           </p:cNvPr>
@@ -2842,7 +2853,7 @@
           <p:cNvPr id="5" name="Datumsplatzhalter 4">
             <a:extLst>
               <a:ext uri="{FF2B5EF4-FFF2-40B4-BE49-F238E27FC236}">
-                <a16:creationId xmlns:a16="http://schemas.microsoft.com/office/drawing/2014/main" xmlns="" id="{30B9CDBD-7C7B-4216-8C66-FD430911CA89}"/>
+                <a16:creationId xmlns:a16="http://schemas.microsoft.com/office/drawing/2014/main" id="{30B9CDBD-7C7B-4216-8C66-FD430911CA89}"/>
               </a:ext>
             </a:extLst>
           </p:cNvPr>
@@ -2872,7 +2883,7 @@
           <p:cNvPr id="6" name="Fußzeilenplatzhalter 5">
             <a:extLst>
               <a:ext uri="{FF2B5EF4-FFF2-40B4-BE49-F238E27FC236}">
-                <a16:creationId xmlns:a16="http://schemas.microsoft.com/office/drawing/2014/main" xmlns="" id="{BD1392A0-B764-4B62-9838-7BE6BA2A39CA}"/>
+                <a16:creationId xmlns:a16="http://schemas.microsoft.com/office/drawing/2014/main" id="{BD1392A0-B764-4B62-9838-7BE6BA2A39CA}"/>
               </a:ext>
             </a:extLst>
           </p:cNvPr>
@@ -2900,7 +2911,7 @@
           <p:cNvPr id="7" name="Foliennummernplatzhalter 6">
             <a:extLst>
               <a:ext uri="{FF2B5EF4-FFF2-40B4-BE49-F238E27FC236}">
-                <a16:creationId xmlns:a16="http://schemas.microsoft.com/office/drawing/2014/main" xmlns="" id="{F18A84F9-6B91-48A7-AD03-1F42C934B50D}"/>
+                <a16:creationId xmlns:a16="http://schemas.microsoft.com/office/drawing/2014/main" id="{F18A84F9-6B91-48A7-AD03-1F42C934B50D}"/>
               </a:ext>
             </a:extLst>
           </p:cNvPr>
@@ -2928,7 +2939,7 @@
     </p:spTree>
     <p:extLst>
       <p:ext uri="{BB962C8B-B14F-4D97-AF65-F5344CB8AC3E}">
-        <p14:creationId xmlns:p14="http://schemas.microsoft.com/office/powerpoint/2010/main" xmlns="" val="944243853"/>
+        <p14:creationId xmlns:p14="http://schemas.microsoft.com/office/powerpoint/2010/main" val="944243853"/>
       </p:ext>
     </p:extLst>
   </p:cSld>
@@ -2960,7 +2971,7 @@
           <p:cNvPr id="2" name="Titel 1">
             <a:extLst>
               <a:ext uri="{FF2B5EF4-FFF2-40B4-BE49-F238E27FC236}">
-                <a16:creationId xmlns:a16="http://schemas.microsoft.com/office/drawing/2014/main" xmlns="" id="{E5F96DB8-B165-49F8-A6CE-F10B872A76EC}"/>
+                <a16:creationId xmlns:a16="http://schemas.microsoft.com/office/drawing/2014/main" id="{E5F96DB8-B165-49F8-A6CE-F10B872A76EC}"/>
               </a:ext>
             </a:extLst>
           </p:cNvPr>
@@ -2998,7 +3009,7 @@
           <p:cNvPr id="3" name="Bildplatzhalter 2">
             <a:extLst>
               <a:ext uri="{FF2B5EF4-FFF2-40B4-BE49-F238E27FC236}">
-                <a16:creationId xmlns:a16="http://schemas.microsoft.com/office/drawing/2014/main" xmlns="" id="{3213A6F8-0C74-4ACA-BF28-E827A7FD4F45}"/>
+                <a16:creationId xmlns:a16="http://schemas.microsoft.com/office/drawing/2014/main" id="{3213A6F8-0C74-4ACA-BF28-E827A7FD4F45}"/>
               </a:ext>
             </a:extLst>
           </p:cNvPr>
@@ -3065,7 +3076,7 @@
           <p:cNvPr id="4" name="Textplatzhalter 3">
             <a:extLst>
               <a:ext uri="{FF2B5EF4-FFF2-40B4-BE49-F238E27FC236}">
-                <a16:creationId xmlns:a16="http://schemas.microsoft.com/office/drawing/2014/main" xmlns="" id="{AA79791D-43F4-4880-80CA-F3FEA78C0AE7}"/>
+                <a16:creationId xmlns:a16="http://schemas.microsoft.com/office/drawing/2014/main" id="{AA79791D-43F4-4880-80CA-F3FEA78C0AE7}"/>
               </a:ext>
             </a:extLst>
           </p:cNvPr>
@@ -3136,7 +3147,7 @@
           <p:cNvPr id="5" name="Datumsplatzhalter 4">
             <a:extLst>
               <a:ext uri="{FF2B5EF4-FFF2-40B4-BE49-F238E27FC236}">
-                <a16:creationId xmlns:a16="http://schemas.microsoft.com/office/drawing/2014/main" xmlns="" id="{43D20290-2BE3-439B-89AE-137D1982F934}"/>
+                <a16:creationId xmlns:a16="http://schemas.microsoft.com/office/drawing/2014/main" id="{43D20290-2BE3-439B-89AE-137D1982F934}"/>
               </a:ext>
             </a:extLst>
           </p:cNvPr>
@@ -3166,7 +3177,7 @@
           <p:cNvPr id="6" name="Fußzeilenplatzhalter 5">
             <a:extLst>
               <a:ext uri="{FF2B5EF4-FFF2-40B4-BE49-F238E27FC236}">
-                <a16:creationId xmlns:a16="http://schemas.microsoft.com/office/drawing/2014/main" xmlns="" id="{21521406-FDDC-480D-992A-4423B7B1FF9C}"/>
+                <a16:creationId xmlns:a16="http://schemas.microsoft.com/office/drawing/2014/main" id="{21521406-FDDC-480D-992A-4423B7B1FF9C}"/>
               </a:ext>
             </a:extLst>
           </p:cNvPr>
@@ -3194,7 +3205,7 @@
           <p:cNvPr id="7" name="Foliennummernplatzhalter 6">
             <a:extLst>
               <a:ext uri="{FF2B5EF4-FFF2-40B4-BE49-F238E27FC236}">
-                <a16:creationId xmlns:a16="http://schemas.microsoft.com/office/drawing/2014/main" xmlns="" id="{6252FD17-38F4-47D8-AC9D-C596C71BF471}"/>
+                <a16:creationId xmlns:a16="http://schemas.microsoft.com/office/drawing/2014/main" id="{6252FD17-38F4-47D8-AC9D-C596C71BF471}"/>
               </a:ext>
             </a:extLst>
           </p:cNvPr>
@@ -3222,7 +3233,7 @@
     </p:spTree>
     <p:extLst>
       <p:ext uri="{BB962C8B-B14F-4D97-AF65-F5344CB8AC3E}">
-        <p14:creationId xmlns:p14="http://schemas.microsoft.com/office/powerpoint/2010/main" xmlns="" val="956904001"/>
+        <p14:creationId xmlns:p14="http://schemas.microsoft.com/office/powerpoint/2010/main" val="956904001"/>
       </p:ext>
     </p:extLst>
   </p:cSld>
@@ -3259,7 +3270,7 @@
           <p:cNvPr id="2" name="Titelplatzhalter 1">
             <a:extLst>
               <a:ext uri="{FF2B5EF4-FFF2-40B4-BE49-F238E27FC236}">
-                <a16:creationId xmlns:a16="http://schemas.microsoft.com/office/drawing/2014/main" xmlns="" id="{048E05F1-75A1-4ECE-A52A-DC2CD1788204}"/>
+                <a16:creationId xmlns:a16="http://schemas.microsoft.com/office/drawing/2014/main" id="{048E05F1-75A1-4ECE-A52A-DC2CD1788204}"/>
               </a:ext>
             </a:extLst>
           </p:cNvPr>
@@ -3298,7 +3309,7 @@
           <p:cNvPr id="3" name="Textplatzhalter 2">
             <a:extLst>
               <a:ext uri="{FF2B5EF4-FFF2-40B4-BE49-F238E27FC236}">
-                <a16:creationId xmlns:a16="http://schemas.microsoft.com/office/drawing/2014/main" xmlns="" id="{56C9E6A1-91BC-481B-BC54-947A4732BBBF}"/>
+                <a16:creationId xmlns:a16="http://schemas.microsoft.com/office/drawing/2014/main" id="{56C9E6A1-91BC-481B-BC54-947A4732BBBF}"/>
               </a:ext>
             </a:extLst>
           </p:cNvPr>
@@ -3366,7 +3377,7 @@
           <p:cNvPr id="4" name="Datumsplatzhalter 3">
             <a:extLst>
               <a:ext uri="{FF2B5EF4-FFF2-40B4-BE49-F238E27FC236}">
-                <a16:creationId xmlns:a16="http://schemas.microsoft.com/office/drawing/2014/main" xmlns="" id="{6973CC79-E448-48A9-A3F7-53C7B716402D}"/>
+                <a16:creationId xmlns:a16="http://schemas.microsoft.com/office/drawing/2014/main" id="{6973CC79-E448-48A9-A3F7-53C7B716402D}"/>
               </a:ext>
             </a:extLst>
           </p:cNvPr>
@@ -3414,7 +3425,7 @@
           <p:cNvPr id="5" name="Fußzeilenplatzhalter 4">
             <a:extLst>
               <a:ext uri="{FF2B5EF4-FFF2-40B4-BE49-F238E27FC236}">
-                <a16:creationId xmlns:a16="http://schemas.microsoft.com/office/drawing/2014/main" xmlns="" id="{7795721C-4745-4B88-92E4-7CBF093991FA}"/>
+                <a16:creationId xmlns:a16="http://schemas.microsoft.com/office/drawing/2014/main" id="{7795721C-4745-4B88-92E4-7CBF093991FA}"/>
               </a:ext>
             </a:extLst>
           </p:cNvPr>
@@ -3460,7 +3471,7 @@
           <p:cNvPr id="6" name="Foliennummernplatzhalter 5">
             <a:extLst>
               <a:ext uri="{FF2B5EF4-FFF2-40B4-BE49-F238E27FC236}">
-                <a16:creationId xmlns:a16="http://schemas.microsoft.com/office/drawing/2014/main" xmlns="" id="{7078AC67-E5D8-452E-9E2C-C0340BE02AD2}"/>
+                <a16:creationId xmlns:a16="http://schemas.microsoft.com/office/drawing/2014/main" id="{7078AC67-E5D8-452E-9E2C-C0340BE02AD2}"/>
               </a:ext>
             </a:extLst>
           </p:cNvPr>
@@ -3506,7 +3517,7 @@
     </p:spTree>
     <p:extLst>
       <p:ext uri="{BB962C8B-B14F-4D97-AF65-F5344CB8AC3E}">
-        <p14:creationId xmlns:p14="http://schemas.microsoft.com/office/powerpoint/2010/main" xmlns="" val="488779113"/>
+        <p14:creationId xmlns:p14="http://schemas.microsoft.com/office/powerpoint/2010/main" val="488779113"/>
       </p:ext>
     </p:extLst>
   </p:cSld>
@@ -3838,10 +3849,10 @@
           <p:cNvPr id="71" name="Rectangle 70">
             <a:extLst>
               <a:ext uri="{FF2B5EF4-FFF2-40B4-BE49-F238E27FC236}">
-                <a16:creationId xmlns:a16="http://schemas.microsoft.com/office/drawing/2014/main" xmlns="" id="{2A0E4E09-FC02-4ADC-951A-3FFA90B6FE39}"/>
+                <a16:creationId xmlns:a16="http://schemas.microsoft.com/office/drawing/2014/main" id="{2A0E4E09-FC02-4ADC-951A-3FFA90B6FE39}"/>
               </a:ext>
               <a:ext uri="{C183D7F6-B498-43B3-948B-1728B52AA6E4}">
-                <adec:decorative xmlns:adec="http://schemas.microsoft.com/office/drawing/2017/decorative" xmlns="" val="1"/>
+                <adec:decorative xmlns:adec="http://schemas.microsoft.com/office/drawing/2017/decorative" val="1"/>
               </a:ext>
             </a:extLst>
           </p:cNvPr>
@@ -3851,7 +3862,7 @@
           <p:nvPr>
             <p:extLst>
               <p:ext uri="{386F3935-93C4-4BCD-93E2-E3B085C9AB24}">
-                <p16:designElem xmlns:p16="http://schemas.microsoft.com/office/powerpoint/2015/main" xmlns="" val="1"/>
+                <p16:designElem xmlns:p16="http://schemas.microsoft.com/office/powerpoint/2015/main" val="1"/>
               </p:ext>
             </p:extLst>
           </p:nvPr>
@@ -3901,7 +3912,7 @@
           <p:cNvPr id="1026" name="Picture 2" descr="Ameise, Schwarze Ameise, Natur, Animalia, Tierwelt">
             <a:extLst>
               <a:ext uri="{FF2B5EF4-FFF2-40B4-BE49-F238E27FC236}">
-                <a16:creationId xmlns:a16="http://schemas.microsoft.com/office/drawing/2014/main" xmlns="" id="{D8089277-10C9-4942-A52C-F0103F381455}"/>
+                <a16:creationId xmlns:a16="http://schemas.microsoft.com/office/drawing/2014/main" id="{D8089277-10C9-4942-A52C-F0103F381455}"/>
               </a:ext>
             </a:extLst>
           </p:cNvPr>
@@ -3915,7 +3926,7 @@
             <a:alphaModFix/>
             <a:extLst>
               <a:ext uri="{28A0092B-C50C-407E-A947-70E740481C1C}">
-                <a14:useLocalDpi xmlns:a14="http://schemas.microsoft.com/office/drawing/2010/main" xmlns="" val="0"/>
+                <a14:useLocalDpi xmlns:a14="http://schemas.microsoft.com/office/drawing/2010/main" val="0"/>
               </a:ext>
             </a:extLst>
           </a:blip>
@@ -3933,7 +3944,7 @@
           <a:noFill/>
           <a:extLst>
             <a:ext uri="{909E8E84-426E-40DD-AFC4-6F175D3DCCD1}">
-              <a14:hiddenFill xmlns:a14="http://schemas.microsoft.com/office/drawing/2010/main" xmlns="">
+              <a14:hiddenFill xmlns:a14="http://schemas.microsoft.com/office/drawing/2010/main">
                 <a:solidFill>
                   <a:srgbClr val="FFFFFF"/>
                 </a:solidFill>
@@ -3947,10 +3958,10 @@
           <p:cNvPr id="1034" name="Picture 72">
             <a:extLst>
               <a:ext uri="{FF2B5EF4-FFF2-40B4-BE49-F238E27FC236}">
-                <a16:creationId xmlns:a16="http://schemas.microsoft.com/office/drawing/2014/main" xmlns="" id="{24F266AD-725B-4A9D-B448-4C000F95CB47}"/>
+                <a16:creationId xmlns:a16="http://schemas.microsoft.com/office/drawing/2014/main" id="{24F266AD-725B-4A9D-B448-4C000F95CB47}"/>
               </a:ext>
               <a:ext uri="{C183D7F6-B498-43B3-948B-1728B52AA6E4}">
-                <adec:decorative xmlns:adec="http://schemas.microsoft.com/office/drawing/2017/decorative" xmlns="" val="1"/>
+                <adec:decorative xmlns:adec="http://schemas.microsoft.com/office/drawing/2017/decorative" val="1"/>
               </a:ext>
             </a:extLst>
           </p:cNvPr>
@@ -3960,7 +3971,7 @@
           <p:nvPr>
             <p:extLst>
               <p:ext uri="{386F3935-93C4-4BCD-93E2-E3B085C9AB24}">
-                <p16:designElem xmlns:p16="http://schemas.microsoft.com/office/powerpoint/2015/main" xmlns="" val="1"/>
+                <p16:designElem xmlns:p16="http://schemas.microsoft.com/office/powerpoint/2015/main" val="1"/>
               </p:ext>
             </p:extLst>
           </p:nvPr>
@@ -3969,7 +3980,7 @@
           <a:blip r:embed="rId3" cstate="print">
             <a:extLst>
               <a:ext uri="{28A0092B-C50C-407E-A947-70E740481C1C}">
-                <a14:useLocalDpi xmlns:a14="http://schemas.microsoft.com/office/drawing/2010/main" xmlns="" val="0"/>
+                <a14:useLocalDpi xmlns:a14="http://schemas.microsoft.com/office/drawing/2010/main" val="0"/>
               </a:ext>
             </a:extLst>
           </a:blip>
@@ -3992,7 +4003,7 @@
           <p:cNvPr id="2" name="Titel 1">
             <a:extLst>
               <a:ext uri="{FF2B5EF4-FFF2-40B4-BE49-F238E27FC236}">
-                <a16:creationId xmlns:a16="http://schemas.microsoft.com/office/drawing/2014/main" xmlns="" id="{EEE36218-B0CE-4CD0-98BB-16069E6C39F3}"/>
+                <a16:creationId xmlns:a16="http://schemas.microsoft.com/office/drawing/2014/main" id="{EEE36218-B0CE-4CD0-98BB-16069E6C39F3}"/>
               </a:ext>
             </a:extLst>
           </p:cNvPr>
@@ -4017,60 +4028,55 @@
           <a:p>
             <a:pPr algn="l"/>
             <a:r>
-              <a:rPr lang="en-US" sz="4800" dirty="0" smtClean="0">
+              <a:rPr lang="en-US" sz="4800" dirty="0">
                 <a:solidFill>
                   <a:srgbClr val="000000"/>
                 </a:solidFill>
               </a:rPr>
               <a:t>Back to home in desert</a:t>
             </a:r>
-            <a:endParaRPr lang="en-US" sz="4800" dirty="0">
+          </a:p>
+        </p:txBody>
+      </p:sp>
+      <p:sp>
+        <p:nvSpPr>
+          <p:cNvPr id="3" name="Untertitel 2">
+            <a:extLst>
+              <a:ext uri="{FF2B5EF4-FFF2-40B4-BE49-F238E27FC236}">
+                <a16:creationId xmlns:a16="http://schemas.microsoft.com/office/drawing/2014/main" id="{A76AD7FB-3E4B-4E76-89E7-D1B0E091D440}"/>
+              </a:ext>
+            </a:extLst>
+          </p:cNvPr>
+          <p:cNvSpPr>
+            <a:spLocks noGrp="1"/>
+          </p:cNvSpPr>
+          <p:nvPr>
+            <p:ph type="subTitle" idx="1"/>
+          </p:nvPr>
+        </p:nvSpPr>
+        <p:spPr>
+          <a:xfrm>
+            <a:off x="6703565" y="1677601"/>
+            <a:ext cx="4218901" cy="3885846"/>
+          </a:xfrm>
+        </p:spPr>
+        <p:txBody>
+          <a:bodyPr anchor="b">
+            <a:noAutofit/>
+          </a:bodyPr>
+          <a:lstStyle/>
+          <a:p>
+            <a:pPr algn="l"/>
+            <a:endParaRPr lang="en-US" dirty="0">
               <a:solidFill>
                 <a:srgbClr val="000000"/>
               </a:solidFill>
             </a:endParaRPr>
           </a:p>
-        </p:txBody>
-      </p:sp>
-      <p:sp>
-        <p:nvSpPr>
-          <p:cNvPr id="3" name="Untertitel 2">
-            <a:extLst>
-              <a:ext uri="{FF2B5EF4-FFF2-40B4-BE49-F238E27FC236}">
-                <a16:creationId xmlns:a16="http://schemas.microsoft.com/office/drawing/2014/main" xmlns="" id="{A76AD7FB-3E4B-4E76-89E7-D1B0E091D440}"/>
-              </a:ext>
-            </a:extLst>
-          </p:cNvPr>
-          <p:cNvSpPr>
-            <a:spLocks noGrp="1"/>
-          </p:cNvSpPr>
-          <p:nvPr>
-            <p:ph type="subTitle" idx="1"/>
-          </p:nvPr>
-        </p:nvSpPr>
-        <p:spPr>
-          <a:xfrm>
-            <a:off x="6703565" y="1677601"/>
-            <a:ext cx="4218901" cy="3885846"/>
-          </a:xfrm>
-        </p:spPr>
-        <p:txBody>
-          <a:bodyPr anchor="b">
-            <a:noAutofit/>
-          </a:bodyPr>
-          <a:lstStyle/>
           <a:p>
             <a:pPr algn="l"/>
-            <a:endParaRPr lang="en-US" dirty="0" smtClean="0">
-              <a:solidFill>
-                <a:srgbClr val="000000"/>
-              </a:solidFill>
-            </a:endParaRPr>
-          </a:p>
-          <a:p>
-            <a:pPr algn="l"/>
-            <a:r>
-              <a:rPr lang="en-US" sz="2800" dirty="0" smtClean="0">
+            <a:r>
+              <a:rPr lang="en-US" sz="2800" dirty="0">
                 <a:solidFill>
                   <a:srgbClr val="000000"/>
                 </a:solidFill>
@@ -4084,26 +4090,13 @@
               <a:buChar char="•"/>
             </a:pPr>
             <a:r>
-              <a:rPr lang="en-US" sz="2800" dirty="0" smtClean="0">
+              <a:rPr lang="en-US" sz="2800" dirty="0">
                 <a:solidFill>
                   <a:srgbClr val="000000"/>
                 </a:solidFill>
               </a:rPr>
-              <a:t>Paper of M. </a:t>
-            </a:r>
-            <a:r>
-              <a:rPr lang="en-US" sz="2800" dirty="0" err="1" smtClean="0">
-                <a:solidFill>
-                  <a:srgbClr val="000000"/>
-                </a:solidFill>
-              </a:rPr>
-              <a:t>Collett</a:t>
-            </a:r>
-            <a:endParaRPr lang="en-US" sz="2800" dirty="0" smtClean="0">
-              <a:solidFill>
-                <a:srgbClr val="000000"/>
-              </a:solidFill>
-            </a:endParaRPr>
+              <a:t>Paper of M. Collett</a:t>
+            </a:r>
           </a:p>
           <a:p>
             <a:pPr marL="285750" indent="-285750" algn="l">
@@ -4111,7 +4104,7 @@
               <a:buChar char="•"/>
             </a:pPr>
             <a:r>
-              <a:rPr lang="en-US" sz="2800" dirty="0" smtClean="0">
+              <a:rPr lang="en-US" sz="2800" dirty="0">
                 <a:solidFill>
                   <a:srgbClr val="000000"/>
                 </a:solidFill>
@@ -4125,7 +4118,7 @@
               <a:buChar char="•"/>
             </a:pPr>
             <a:r>
-              <a:rPr lang="en-US" sz="2800" dirty="0" smtClean="0">
+              <a:rPr lang="en-US" sz="2800" dirty="0">
                 <a:solidFill>
                   <a:srgbClr val="000000"/>
                 </a:solidFill>
@@ -4139,7 +4132,7 @@
               <a:buChar char="•"/>
             </a:pPr>
             <a:r>
-              <a:rPr lang="en-US" sz="2800" dirty="0" smtClean="0">
+              <a:rPr lang="en-US" sz="2800" dirty="0">
                 <a:solidFill>
                   <a:srgbClr val="000000"/>
                 </a:solidFill>
@@ -4153,7 +4146,7 @@
               <a:buChar char="•"/>
             </a:pPr>
             <a:r>
-              <a:rPr lang="en-US" sz="2800" dirty="0" smtClean="0">
+              <a:rPr lang="en-US" sz="2800" dirty="0">
                 <a:solidFill>
                   <a:srgbClr val="000000"/>
                 </a:solidFill>
@@ -4167,18 +4160,13 @@
               <a:buChar char="•"/>
             </a:pPr>
             <a:r>
-              <a:rPr lang="en-US" sz="2800" dirty="0" smtClean="0">
+              <a:rPr lang="en-US" sz="2800" dirty="0">
                 <a:solidFill>
                   <a:srgbClr val="000000"/>
                 </a:solidFill>
               </a:rPr>
               <a:t>Conclusion</a:t>
             </a:r>
-            <a:endParaRPr lang="en-US" sz="2800" dirty="0">
-              <a:solidFill>
-                <a:srgbClr val="000000"/>
-              </a:solidFill>
-            </a:endParaRPr>
           </a:p>
         </p:txBody>
       </p:sp>
@@ -4187,7 +4175,7 @@
           <p:cNvPr id="4" name="Fußzeilenplatzhalter 3">
             <a:extLst>
               <a:ext uri="{FF2B5EF4-FFF2-40B4-BE49-F238E27FC236}">
-                <a16:creationId xmlns:a16="http://schemas.microsoft.com/office/drawing/2014/main" xmlns="" id="{48385227-788D-4DD6-A5F6-CA3895BD67E0}"/>
+                <a16:creationId xmlns:a16="http://schemas.microsoft.com/office/drawing/2014/main" id="{48385227-788D-4DD6-A5F6-CA3895BD67E0}"/>
               </a:ext>
             </a:extLst>
           </p:cNvPr>
@@ -4220,7 +4208,7 @@
           <p:cNvPr id="8" name="Fußzeilenplatzhalter 3">
             <a:extLst>
               <a:ext uri="{FF2B5EF4-FFF2-40B4-BE49-F238E27FC236}">
-                <a16:creationId xmlns:a16="http://schemas.microsoft.com/office/drawing/2014/main" xmlns="" id="{577930E7-F4F4-4C0B-B284-96928285A575}"/>
+                <a16:creationId xmlns:a16="http://schemas.microsoft.com/office/drawing/2014/main" id="{577930E7-F4F4-4C0B-B284-96928285A575}"/>
               </a:ext>
             </a:extLst>
           </p:cNvPr>
@@ -4348,7 +4336,7 @@
     </p:spTree>
     <p:extLst>
       <p:ext uri="{BB962C8B-B14F-4D97-AF65-F5344CB8AC3E}">
-        <p14:creationId xmlns:p14="http://schemas.microsoft.com/office/powerpoint/2010/main" xmlns="" val="2513955939"/>
+        <p14:creationId xmlns:p14="http://schemas.microsoft.com/office/powerpoint/2010/main" val="2513955939"/>
       </p:ext>
     </p:extLst>
   </p:cSld>
@@ -4391,11 +4379,11 @@
           <a:lstStyle/>
           <a:p>
             <a:r>
-              <a:rPr lang="en-US" dirty="0" smtClean="0"/>
+              <a:rPr lang="en-US" dirty="0"/>
               <a:t>Results test </a:t>
             </a:r>
             <a:r>
-              <a:rPr lang="en-US" dirty="0" err="1" smtClean="0"/>
+              <a:rPr lang="en-US" dirty="0" err="1"/>
               <a:t>Ba</a:t>
             </a:r>
             <a:endParaRPr lang="en-US" dirty="0"/>
@@ -4442,7 +4430,7 @@
           <a:lstStyle/>
           <a:p>
             <a:r>
-              <a:rPr lang="de-CH" smtClean="0"/>
+              <a:rPr lang="de-CH"/>
               <a:t>Josua Graf, Noah Zarro</a:t>
             </a:r>
             <a:endParaRPr lang="de-CH" dirty="0"/>
@@ -4511,10 +4499,9 @@
           <a:p>
             <a:pPr algn="ctr"/>
             <a:r>
-              <a:rPr lang="en-US" dirty="0" smtClean="0"/>
+              <a:rPr lang="en-US" dirty="0"/>
               <a:t>nest</a:t>
             </a:r>
-            <a:endParaRPr lang="en-US" dirty="0"/>
           </a:p>
         </p:txBody>
       </p:sp>
@@ -4637,10 +4624,9 @@
           <a:p>
             <a:pPr algn="ctr"/>
             <a:r>
-              <a:rPr lang="en-US" dirty="0" smtClean="0"/>
+              <a:rPr lang="en-US" dirty="0"/>
               <a:t>feeder</a:t>
             </a:r>
-            <a:endParaRPr lang="en-US" dirty="0"/>
           </a:p>
         </p:txBody>
       </p:sp>
@@ -4767,10 +4753,9 @@
           <a:lstStyle/>
           <a:p>
             <a:r>
-              <a:rPr lang="en-US" dirty="0" smtClean="0"/>
+              <a:rPr lang="en-US" dirty="0"/>
               <a:t>Result test 2b</a:t>
             </a:r>
-            <a:endParaRPr lang="en-US" dirty="0"/>
           </a:p>
         </p:txBody>
       </p:sp>
@@ -4790,7 +4775,7 @@
           <a:lstStyle/>
           <a:p>
             <a:r>
-              <a:rPr lang="de-CH" smtClean="0"/>
+              <a:rPr lang="de-CH"/>
               <a:t>Josua Graf, Noah Zarro</a:t>
             </a:r>
             <a:endParaRPr lang="de-CH" dirty="0"/>
@@ -4884,10 +4869,9 @@
           <a:p>
             <a:pPr algn="ctr"/>
             <a:r>
-              <a:rPr lang="en-US" dirty="0" smtClean="0"/>
+              <a:rPr lang="en-US" dirty="0"/>
               <a:t>nest</a:t>
             </a:r>
-            <a:endParaRPr lang="en-US" dirty="0"/>
           </a:p>
         </p:txBody>
       </p:sp>
@@ -5010,10 +4994,9 @@
           <a:p>
             <a:pPr algn="ctr"/>
             <a:r>
-              <a:rPr lang="en-US" dirty="0" smtClean="0"/>
+              <a:rPr lang="en-US" dirty="0"/>
               <a:t>feeder</a:t>
             </a:r>
-            <a:endParaRPr lang="en-US" dirty="0"/>
           </a:p>
         </p:txBody>
       </p:sp>
@@ -5140,7 +5123,7 @@
           <a:lstStyle/>
           <a:p>
             <a:r>
-              <a:rPr lang="de-CH" smtClean="0"/>
+              <a:rPr lang="de-CH"/>
               <a:t>Josua Graf, Noah Zarro</a:t>
             </a:r>
             <a:endParaRPr lang="de-CH" dirty="0"/>
@@ -5168,10 +5151,9 @@
           <a:lstStyle/>
           <a:p>
             <a:r>
-              <a:rPr lang="en-US" dirty="0" smtClean="0"/>
+              <a:rPr lang="en-US" dirty="0"/>
               <a:t>Only local vector</a:t>
             </a:r>
-            <a:endParaRPr lang="en-US" dirty="0"/>
           </a:p>
         </p:txBody>
       </p:sp>
@@ -5214,7 +5196,7 @@
               <a:defRPr/>
             </a:pPr>
             <a:r>
-              <a:rPr kumimoji="0" lang="de-CH" sz="1200" b="0" i="0" u="none" strike="noStrike" kern="1200" cap="none" spc="0" normalizeH="0" baseline="0" noProof="0" smtClean="0">
+              <a:rPr kumimoji="0" lang="de-CH" sz="1200" b="0" i="0" u="none" strike="noStrike" kern="1200" cap="none" spc="0" normalizeH="0" baseline="0" noProof="0">
                 <a:ln>
                   <a:noFill/>
                 </a:ln>
@@ -5313,10 +5295,9 @@
           <a:p>
             <a:pPr algn="ctr"/>
             <a:r>
-              <a:rPr lang="en-US" dirty="0" smtClean="0"/>
+              <a:rPr lang="en-US" dirty="0"/>
               <a:t>nest</a:t>
             </a:r>
-            <a:endParaRPr lang="en-US" dirty="0"/>
           </a:p>
         </p:txBody>
       </p:sp>
@@ -5357,10 +5338,9 @@
           <a:p>
             <a:pPr algn="ctr"/>
             <a:r>
-              <a:rPr lang="en-US" dirty="0" smtClean="0"/>
+              <a:rPr lang="en-US" dirty="0"/>
               <a:t>feeder</a:t>
             </a:r>
-            <a:endParaRPr lang="en-US" dirty="0"/>
           </a:p>
         </p:txBody>
       </p:sp>
@@ -5528,7 +5508,7 @@
           <p:cNvPr id="2" name="Titel 1">
             <a:extLst>
               <a:ext uri="{FF2B5EF4-FFF2-40B4-BE49-F238E27FC236}">
-                <a16:creationId xmlns:a16="http://schemas.microsoft.com/office/drawing/2014/main" xmlns="" id="{6911A3BF-FF4F-4F3C-A97C-AF7BB6BEB792}"/>
+                <a16:creationId xmlns:a16="http://schemas.microsoft.com/office/drawing/2014/main" id="{6911A3BF-FF4F-4F3C-A97C-AF7BB6BEB792}"/>
               </a:ext>
             </a:extLst>
           </p:cNvPr>
@@ -5591,7 +5571,7 @@
           <p:cNvPr id="3" name="Inhaltsplatzhalter 2">
             <a:extLst>
               <a:ext uri="{FF2B5EF4-FFF2-40B4-BE49-F238E27FC236}">
-                <a16:creationId xmlns:a16="http://schemas.microsoft.com/office/drawing/2014/main" xmlns="" id="{3F9C8343-57AA-4D3E-AC88-05C8B37280B8}"/>
+                <a16:creationId xmlns:a16="http://schemas.microsoft.com/office/drawing/2014/main" id="{3F9C8343-57AA-4D3E-AC88-05C8B37280B8}"/>
               </a:ext>
             </a:extLst>
           </p:cNvPr>
@@ -5608,50 +5588,50 @@
           <a:lstStyle/>
           <a:p>
             <a:r>
-              <a:rPr lang="en-US" dirty="0" smtClean="0"/>
+              <a:rPr lang="en-US" dirty="0"/>
               <a:t>Written in 1998</a:t>
             </a:r>
           </a:p>
           <a:p>
             <a:r>
-              <a:rPr lang="en-US" dirty="0" smtClean="0"/>
+              <a:rPr lang="en-US" dirty="0"/>
               <a:t>Navigation of desert ants</a:t>
             </a:r>
           </a:p>
           <a:p>
             <a:r>
-              <a:rPr lang="en-US" dirty="0" smtClean="0"/>
+              <a:rPr lang="en-US" dirty="0"/>
               <a:t>M. </a:t>
             </a:r>
             <a:r>
-              <a:rPr lang="en-US" dirty="0" err="1" smtClean="0"/>
+              <a:rPr lang="en-US" dirty="0" err="1"/>
               <a:t>Collett</a:t>
             </a:r>
             <a:r>
-              <a:rPr lang="en-US" dirty="0" smtClean="0"/>
+              <a:rPr lang="en-US" dirty="0"/>
               <a:t>, T. S. </a:t>
             </a:r>
             <a:r>
-              <a:rPr lang="en-US" dirty="0" err="1" smtClean="0"/>
+              <a:rPr lang="en-US" dirty="0" err="1"/>
               <a:t>Collett</a:t>
             </a:r>
             <a:r>
-              <a:rPr lang="en-US" dirty="0" smtClean="0"/>
+              <a:rPr lang="en-US" dirty="0"/>
               <a:t>, S. </a:t>
             </a:r>
             <a:r>
-              <a:rPr lang="en-US" dirty="0" err="1" smtClean="0"/>
+              <a:rPr lang="en-US" dirty="0" err="1"/>
               <a:t>Bisch</a:t>
             </a:r>
             <a:r>
-              <a:rPr lang="en-US" dirty="0" smtClean="0"/>
+              <a:rPr lang="en-US" dirty="0"/>
               <a:t>, R. </a:t>
             </a:r>
             <a:r>
-              <a:rPr lang="en-US" dirty="0" err="1" smtClean="0"/>
+              <a:rPr lang="en-US" dirty="0" err="1"/>
               <a:t>Wehner</a:t>
             </a:r>
-            <a:endParaRPr lang="en-US" dirty="0" smtClean="0"/>
+            <a:endParaRPr lang="en-US" dirty="0"/>
           </a:p>
           <a:p>
             <a:endParaRPr lang="de-CH" dirty="0"/>
@@ -5672,7 +5652,7 @@
           <p:cNvPr id="4" name="Fußzeilenplatzhalter 3">
             <a:extLst>
               <a:ext uri="{FF2B5EF4-FFF2-40B4-BE49-F238E27FC236}">
-                <a16:creationId xmlns:a16="http://schemas.microsoft.com/office/drawing/2014/main" xmlns="" id="{948DC6C5-E66E-4CFD-9A84-F79BA83ABA99}"/>
+                <a16:creationId xmlns:a16="http://schemas.microsoft.com/office/drawing/2014/main" id="{948DC6C5-E66E-4CFD-9A84-F79BA83ABA99}"/>
               </a:ext>
             </a:extLst>
           </p:cNvPr>
@@ -5698,7 +5678,7 @@
     </p:spTree>
     <p:extLst>
       <p:ext uri="{BB962C8B-B14F-4D97-AF65-F5344CB8AC3E}">
-        <p14:creationId xmlns:p14="http://schemas.microsoft.com/office/powerpoint/2010/main" xmlns="" val="876636335"/>
+        <p14:creationId xmlns:p14="http://schemas.microsoft.com/office/powerpoint/2010/main" val="876636335"/>
       </p:ext>
     </p:extLst>
   </p:cSld>
@@ -5730,7 +5710,7 @@
           <p:cNvPr id="2" name="Titel 1">
             <a:extLst>
               <a:ext uri="{FF2B5EF4-FFF2-40B4-BE49-F238E27FC236}">
-                <a16:creationId xmlns:a16="http://schemas.microsoft.com/office/drawing/2014/main" xmlns="" id="{E9D7E0D1-1C29-400F-AE01-3B6B640485CA}"/>
+                <a16:creationId xmlns:a16="http://schemas.microsoft.com/office/drawing/2014/main" id="{E9D7E0D1-1C29-400F-AE01-3B6B640485CA}"/>
               </a:ext>
             </a:extLst>
           </p:cNvPr>
@@ -5771,7 +5751,7 @@
           <p:cNvPr id="3" name="Inhaltsplatzhalter 2">
             <a:extLst>
               <a:ext uri="{FF2B5EF4-FFF2-40B4-BE49-F238E27FC236}">
-                <a16:creationId xmlns:a16="http://schemas.microsoft.com/office/drawing/2014/main" xmlns="" id="{FF8B92C8-DC85-4E2D-8C9D-A1EBA3F34D19}"/>
+                <a16:creationId xmlns:a16="http://schemas.microsoft.com/office/drawing/2014/main" id="{FF8B92C8-DC85-4E2D-8C9D-A1EBA3F34D19}"/>
               </a:ext>
             </a:extLst>
           </p:cNvPr>
@@ -5788,23 +5768,44 @@
           <a:lstStyle/>
           <a:p>
             <a:r>
-              <a:rPr lang="en-US" dirty="0" smtClean="0"/>
-              <a:t>Problem: no visible landmarks in desert</a:t>
-            </a:r>
-          </a:p>
-          <a:p>
-            <a:r>
-              <a:rPr lang="en-US" dirty="0" smtClean="0"/>
-              <a:t>Solution: path integration</a:t>
-            </a:r>
-          </a:p>
-          <a:p>
-            <a:r>
-              <a:rPr lang="en-US" dirty="0" smtClean="0"/>
+              <a:rPr lang="en-US" dirty="0"/>
+              <a:t>Problem: few visible landmarks in desert</a:t>
+            </a:r>
+          </a:p>
+          <a:p>
+            <a:r>
+              <a:rPr lang="en-US" dirty="0"/>
+              <a:t>Solution: path integration =&gt; global vector</a:t>
+            </a:r>
+          </a:p>
+          <a:p>
+            <a:pPr lvl="1"/>
+            <a:r>
+              <a:rPr lang="en-US" dirty="0"/>
               <a:t>Sun as compass</a:t>
             </a:r>
           </a:p>
           <a:p>
+            <a:r>
+              <a:rPr lang="en-US" dirty="0"/>
+              <a:t>Landmarks =&gt; local vector</a:t>
+            </a:r>
+          </a:p>
+          <a:p>
+            <a:pPr lvl="1"/>
+            <a:r>
+              <a:rPr lang="en-US" dirty="0"/>
+              <a:t>Relative to cardinal direction</a:t>
+            </a:r>
+          </a:p>
+          <a:p>
+            <a:pPr lvl="1"/>
+            <a:r>
+              <a:rPr lang="en-US" dirty="0"/>
+              <a:t>Interesting, because sun is needed</a:t>
+            </a:r>
+          </a:p>
+          <a:p>
             <a:endParaRPr lang="de-CH" dirty="0"/>
           </a:p>
           <a:p>
@@ -5817,7 +5818,7 @@
           <p:cNvPr id="4" name="Fußzeilenplatzhalter 3">
             <a:extLst>
               <a:ext uri="{FF2B5EF4-FFF2-40B4-BE49-F238E27FC236}">
-                <a16:creationId xmlns:a16="http://schemas.microsoft.com/office/drawing/2014/main" xmlns="" id="{4295BE47-FA69-4F94-8A6C-2A05762C1F5E}"/>
+                <a16:creationId xmlns:a16="http://schemas.microsoft.com/office/drawing/2014/main" id="{4295BE47-FA69-4F94-8A6C-2A05762C1F5E}"/>
               </a:ext>
             </a:extLst>
           </p:cNvPr>
@@ -5845,7 +5846,7 @@
           <p:cNvPr id="6" name="Grafik 5">
             <a:extLst>
               <a:ext uri="{FF2B5EF4-FFF2-40B4-BE49-F238E27FC236}">
-                <a16:creationId xmlns:a16="http://schemas.microsoft.com/office/drawing/2014/main" xmlns="" id="{0AA8CCD8-7B78-4F90-AA8C-6D146AE4548A}"/>
+                <a16:creationId xmlns:a16="http://schemas.microsoft.com/office/drawing/2014/main" id="{0AA8CCD8-7B78-4F90-AA8C-6D146AE4548A}"/>
               </a:ext>
             </a:extLst>
           </p:cNvPr>
@@ -5858,7 +5859,7 @@
           <a:blip r:embed="rId2" cstate="print">
             <a:extLst>
               <a:ext uri="{28A0092B-C50C-407E-A947-70E740481C1C}">
-                <a14:useLocalDpi xmlns:a14="http://schemas.microsoft.com/office/drawing/2010/main" xmlns="" val="0"/>
+                <a14:useLocalDpi xmlns:a14="http://schemas.microsoft.com/office/drawing/2010/main" val="0"/>
               </a:ext>
             </a:extLst>
           </a:blip>
@@ -5881,7 +5882,7 @@
           <p:cNvPr id="9" name="Sonne 8">
             <a:extLst>
               <a:ext uri="{FF2B5EF4-FFF2-40B4-BE49-F238E27FC236}">
-                <a16:creationId xmlns:a16="http://schemas.microsoft.com/office/drawing/2014/main" xmlns="" id="{D402957D-85FF-48ED-BD80-C1520C81BB5E}"/>
+                <a16:creationId xmlns:a16="http://schemas.microsoft.com/office/drawing/2014/main" id="{D402957D-85FF-48ED-BD80-C1520C81BB5E}"/>
               </a:ext>
             </a:extLst>
           </p:cNvPr>
@@ -5899,15 +5900,15 @@
         </p:spPr>
         <p:style>
           <a:lnRef idx="2">
-            <a:schemeClr val="accent4">
+            <a:schemeClr val="accent2">
               <a:shade val="50000"/>
             </a:schemeClr>
           </a:lnRef>
           <a:fillRef idx="1">
-            <a:schemeClr val="accent4"/>
+            <a:schemeClr val="accent2"/>
           </a:fillRef>
           <a:effectRef idx="0">
-            <a:schemeClr val="accent4"/>
+            <a:schemeClr val="accent2"/>
           </a:effectRef>
           <a:fontRef idx="minor">
             <a:schemeClr val="lt1"/>
@@ -5922,10 +5923,57 @@
           </a:p>
         </p:txBody>
       </p:sp>
+      <p:pic>
+        <p:nvPicPr>
+          <p:cNvPr id="1026" name="Picture 2" descr="Clipart ilmenskie rock dull mid4 image">
+            <a:extLst>
+              <a:ext uri="{FF2B5EF4-FFF2-40B4-BE49-F238E27FC236}">
+                <a16:creationId xmlns:a16="http://schemas.microsoft.com/office/drawing/2014/main" id="{48F7896D-80C6-413F-B8AB-C27F29C00238}"/>
+              </a:ext>
+            </a:extLst>
+          </p:cNvPr>
+          <p:cNvPicPr>
+            <a:picLocks noChangeAspect="1" noChangeArrowheads="1"/>
+          </p:cNvPicPr>
+          <p:nvPr/>
+        </p:nvPicPr>
+        <p:blipFill>
+          <a:blip r:embed="rId3">
+            <a:extLst>
+              <a:ext uri="{28A0092B-C50C-407E-A947-70E740481C1C}">
+                <a14:useLocalDpi xmlns:a14="http://schemas.microsoft.com/office/drawing/2010/main" val="0"/>
+              </a:ext>
+            </a:extLst>
+          </a:blip>
+          <a:srcRect/>
+          <a:stretch>
+            <a:fillRect/>
+          </a:stretch>
+        </p:blipFill>
+        <p:spPr bwMode="auto">
+          <a:xfrm>
+            <a:off x="7940351" y="5097340"/>
+            <a:ext cx="759680" cy="711891"/>
+          </a:xfrm>
+          <a:prstGeom prst="rect">
+            <a:avLst/>
+          </a:prstGeom>
+          <a:noFill/>
+          <a:extLst>
+            <a:ext uri="{909E8E84-426E-40DD-AFC4-6F175D3DCCD1}">
+              <a14:hiddenFill xmlns:a14="http://schemas.microsoft.com/office/drawing/2010/main">
+                <a:solidFill>
+                  <a:srgbClr val="FFFFFF"/>
+                </a:solidFill>
+              </a14:hiddenFill>
+            </a:ext>
+          </a:extLst>
+        </p:spPr>
+      </p:pic>
     </p:spTree>
     <p:extLst>
       <p:ext uri="{BB962C8B-B14F-4D97-AF65-F5344CB8AC3E}">
-        <p14:creationId xmlns:p14="http://schemas.microsoft.com/office/powerpoint/2010/main" xmlns="" val="3217100557"/>
+        <p14:creationId xmlns:p14="http://schemas.microsoft.com/office/powerpoint/2010/main" val="3217100557"/>
       </p:ext>
     </p:extLst>
   </p:cSld>
@@ -5957,7 +6005,7 @@
           <p:cNvPr id="2" name="Titel 1">
             <a:extLst>
               <a:ext uri="{FF2B5EF4-FFF2-40B4-BE49-F238E27FC236}">
-                <a16:creationId xmlns:a16="http://schemas.microsoft.com/office/drawing/2014/main" xmlns="" id="{0CCF8F83-5F86-4C1B-A872-2B51B518F587}"/>
+                <a16:creationId xmlns:a16="http://schemas.microsoft.com/office/drawing/2014/main" id="{0CCF8F83-5F86-4C1B-A872-2B51B518F587}"/>
               </a:ext>
             </a:extLst>
           </p:cNvPr>
@@ -6030,7 +6078,7 @@
           <p:cNvPr id="3" name="Inhaltsplatzhalter 2">
             <a:extLst>
               <a:ext uri="{FF2B5EF4-FFF2-40B4-BE49-F238E27FC236}">
-                <a16:creationId xmlns:a16="http://schemas.microsoft.com/office/drawing/2014/main" xmlns="" id="{8FA1AA34-7374-4F15-9B76-87F9F2F458C3}"/>
+                <a16:creationId xmlns:a16="http://schemas.microsoft.com/office/drawing/2014/main" id="{8FA1AA34-7374-4F15-9B76-87F9F2F458C3}"/>
               </a:ext>
             </a:extLst>
           </p:cNvPr>
@@ -6046,8 +6094,166 @@
           <a:bodyPr/>
           <a:lstStyle/>
           <a:p>
+            <a:r>
+              <a:rPr lang="de-CH" dirty="0"/>
+              <a:t>Python</a:t>
+            </a:r>
+          </a:p>
+          <a:p>
+            <a:r>
+              <a:rPr lang="de-CH" dirty="0"/>
+              <a:t>Iterative </a:t>
+            </a:r>
+            <a:r>
+              <a:rPr lang="de-CH" dirty="0" err="1"/>
+              <a:t>approach</a:t>
+            </a:r>
             <a:endParaRPr lang="de-CH" dirty="0"/>
           </a:p>
+          <a:p>
+            <a:r>
+              <a:rPr lang="de-CH" dirty="0"/>
+              <a:t>Global and </a:t>
+            </a:r>
+            <a:r>
+              <a:rPr lang="de-CH" dirty="0" err="1"/>
+              <a:t>local</a:t>
+            </a:r>
+            <a:r>
+              <a:rPr lang="de-CH" dirty="0"/>
+              <a:t> </a:t>
+            </a:r>
+            <a:r>
+              <a:rPr lang="de-CH" dirty="0" err="1"/>
+              <a:t>vector</a:t>
+            </a:r>
+            <a:r>
+              <a:rPr lang="de-CH" dirty="0"/>
+              <a:t> </a:t>
+            </a:r>
+            <a:r>
+              <a:rPr lang="de-CH" dirty="0" err="1"/>
+              <a:t>calculated</a:t>
+            </a:r>
+            <a:r>
+              <a:rPr lang="de-CH" dirty="0"/>
+              <a:t> in </a:t>
+            </a:r>
+            <a:r>
+              <a:rPr lang="de-CH" dirty="0" err="1"/>
+              <a:t>every</a:t>
+            </a:r>
+            <a:r>
+              <a:rPr lang="de-CH" dirty="0"/>
+              <a:t> </a:t>
+            </a:r>
+            <a:r>
+              <a:rPr lang="de-CH" dirty="0" err="1"/>
+              <a:t>step</a:t>
+            </a:r>
+            <a:endParaRPr lang="de-CH" dirty="0"/>
+          </a:p>
+          <a:p>
+            <a:r>
+              <a:rPr lang="de-CH" dirty="0"/>
+              <a:t>Global </a:t>
+            </a:r>
+            <a:r>
+              <a:rPr lang="de-CH" dirty="0" err="1"/>
+              <a:t>vector</a:t>
+            </a:r>
+            <a:endParaRPr lang="de-CH" dirty="0"/>
+          </a:p>
+          <a:p>
+            <a:pPr lvl="1"/>
+            <a:r>
+              <a:rPr lang="de-CH" dirty="0" err="1"/>
+              <a:t>Each</a:t>
+            </a:r>
+            <a:r>
+              <a:rPr lang="de-CH" dirty="0"/>
+              <a:t> </a:t>
+            </a:r>
+            <a:r>
+              <a:rPr lang="de-CH" dirty="0" err="1"/>
+              <a:t>step</a:t>
+            </a:r>
+            <a:r>
+              <a:rPr lang="de-CH" dirty="0"/>
+              <a:t> </a:t>
+            </a:r>
+            <a:r>
+              <a:rPr lang="de-CH" dirty="0" err="1"/>
+              <a:t>added</a:t>
+            </a:r>
+            <a:endParaRPr lang="de-CH" dirty="0"/>
+          </a:p>
+          <a:p>
+            <a:pPr lvl="1"/>
+            <a:r>
+              <a:rPr lang="de-CH" dirty="0" err="1"/>
+              <a:t>Randomization</a:t>
+            </a:r>
+            <a:endParaRPr lang="de-CH" dirty="0"/>
+          </a:p>
+          <a:p>
+            <a:r>
+              <a:rPr lang="de-CH" dirty="0" err="1"/>
+              <a:t>Local</a:t>
+            </a:r>
+            <a:r>
+              <a:rPr lang="de-CH" dirty="0"/>
+              <a:t> </a:t>
+            </a:r>
+            <a:r>
+              <a:rPr lang="de-CH" dirty="0" err="1"/>
+              <a:t>vector</a:t>
+            </a:r>
+            <a:endParaRPr lang="de-CH" dirty="0"/>
+          </a:p>
+          <a:p>
+            <a:pPr lvl="1"/>
+            <a:r>
+              <a:rPr lang="de-CH" dirty="0"/>
+              <a:t>Landmarks «pull» </a:t>
+            </a:r>
+            <a:r>
+              <a:rPr lang="de-CH" dirty="0" err="1"/>
+              <a:t>ants</a:t>
+            </a:r>
+            <a:endParaRPr lang="de-CH" dirty="0"/>
+          </a:p>
+          <a:p>
+            <a:pPr lvl="1"/>
+            <a:r>
+              <a:rPr lang="de-CH" dirty="0"/>
+              <a:t>The </a:t>
+            </a:r>
+            <a:r>
+              <a:rPr lang="de-CH" dirty="0" err="1"/>
+              <a:t>closer</a:t>
+            </a:r>
+            <a:r>
+              <a:rPr lang="de-CH" dirty="0"/>
+              <a:t> </a:t>
+            </a:r>
+            <a:r>
+              <a:rPr lang="de-CH" dirty="0" err="1"/>
+              <a:t>the</a:t>
+            </a:r>
+            <a:r>
+              <a:rPr lang="de-CH" dirty="0"/>
+              <a:t> </a:t>
+            </a:r>
+            <a:r>
+              <a:rPr lang="de-CH" dirty="0" err="1"/>
+              <a:t>stronger</a:t>
+            </a:r>
+            <a:endParaRPr lang="de-CH" dirty="0"/>
+          </a:p>
+          <a:p>
+            <a:endParaRPr lang="de-CH" dirty="0"/>
+          </a:p>
         </p:txBody>
       </p:sp>
       <p:sp>
@@ -6055,7 +6261,7 @@
           <p:cNvPr id="4" name="Fußzeilenplatzhalter 3">
             <a:extLst>
               <a:ext uri="{FF2B5EF4-FFF2-40B4-BE49-F238E27FC236}">
-                <a16:creationId xmlns:a16="http://schemas.microsoft.com/office/drawing/2014/main" xmlns="" id="{692283E7-4989-41FA-B51B-042BDE391B89}"/>
+                <a16:creationId xmlns:a16="http://schemas.microsoft.com/office/drawing/2014/main" id="{692283E7-4989-41FA-B51B-042BDE391B89}"/>
               </a:ext>
             </a:extLst>
           </p:cNvPr>
@@ -6076,13 +6282,304 @@
               <a:t>Josua Graf, Noah Zarro</a:t>
             </a:r>
             <a:endParaRPr lang="de-CH" dirty="0"/>
+          </a:p>
+        </p:txBody>
+      </p:sp>
+      <p:cxnSp>
+        <p:nvCxnSpPr>
+          <p:cNvPr id="10" name="Gerade Verbindung mit Pfeil 9">
+            <a:extLst>
+              <a:ext uri="{FF2B5EF4-FFF2-40B4-BE49-F238E27FC236}">
+                <a16:creationId xmlns:a16="http://schemas.microsoft.com/office/drawing/2014/main" id="{B10972C5-0BCD-43D7-B1B1-CADCC0C839F4}"/>
+              </a:ext>
+            </a:extLst>
+          </p:cNvPr>
+          <p:cNvCxnSpPr/>
+          <p:nvPr/>
+        </p:nvCxnSpPr>
+        <p:spPr>
+          <a:xfrm>
+            <a:off x="8153400" y="3954585"/>
+            <a:ext cx="1639277" cy="1516184"/>
+          </a:xfrm>
+          <a:prstGeom prst="straightConnector1">
+            <a:avLst/>
+          </a:prstGeom>
+          <a:ln>
+            <a:solidFill>
+              <a:srgbClr val="0070C0"/>
+            </a:solidFill>
+            <a:tailEnd type="triangle"/>
+          </a:ln>
+        </p:spPr>
+        <p:style>
+          <a:lnRef idx="1">
+            <a:schemeClr val="accent6"/>
+          </a:lnRef>
+          <a:fillRef idx="0">
+            <a:schemeClr val="accent6"/>
+          </a:fillRef>
+          <a:effectRef idx="0">
+            <a:schemeClr val="accent6"/>
+          </a:effectRef>
+          <a:fontRef idx="minor">
+            <a:schemeClr val="tx1"/>
+          </a:fontRef>
+        </p:style>
+      </p:cxnSp>
+      <p:cxnSp>
+        <p:nvCxnSpPr>
+          <p:cNvPr id="12" name="Gerade Verbindung mit Pfeil 11">
+            <a:extLst>
+              <a:ext uri="{FF2B5EF4-FFF2-40B4-BE49-F238E27FC236}">
+                <a16:creationId xmlns:a16="http://schemas.microsoft.com/office/drawing/2014/main" id="{446FCC53-DEF3-487B-9EB4-02101EF7D452}"/>
+              </a:ext>
+            </a:extLst>
+          </p:cNvPr>
+          <p:cNvCxnSpPr/>
+          <p:nvPr/>
+        </p:nvCxnSpPr>
+        <p:spPr>
+          <a:xfrm>
+            <a:off x="9777046" y="5478585"/>
+            <a:ext cx="62523" cy="218830"/>
+          </a:xfrm>
+          <a:prstGeom prst="straightConnector1">
+            <a:avLst/>
+          </a:prstGeom>
+          <a:ln>
+            <a:tailEnd type="triangle"/>
+          </a:ln>
+        </p:spPr>
+        <p:style>
+          <a:lnRef idx="1">
+            <a:schemeClr val="accent1"/>
+          </a:lnRef>
+          <a:fillRef idx="0">
+            <a:schemeClr val="accent1"/>
+          </a:fillRef>
+          <a:effectRef idx="0">
+            <a:schemeClr val="accent1"/>
+          </a:effectRef>
+          <a:fontRef idx="minor">
+            <a:schemeClr val="tx1"/>
+          </a:fontRef>
+        </p:style>
+      </p:cxnSp>
+      <p:cxnSp>
+        <p:nvCxnSpPr>
+          <p:cNvPr id="13" name="Gerade Verbindung mit Pfeil 12">
+            <a:extLst>
+              <a:ext uri="{FF2B5EF4-FFF2-40B4-BE49-F238E27FC236}">
+                <a16:creationId xmlns:a16="http://schemas.microsoft.com/office/drawing/2014/main" id="{F8A5062A-5815-4245-A074-956CFA327CBD}"/>
+              </a:ext>
+            </a:extLst>
+          </p:cNvPr>
+          <p:cNvCxnSpPr>
+            <a:cxnSpLocks/>
+          </p:cNvCxnSpPr>
+          <p:nvPr/>
+        </p:nvCxnSpPr>
+        <p:spPr>
+          <a:xfrm>
+            <a:off x="8153400" y="3946769"/>
+            <a:ext cx="2045677" cy="898769"/>
+          </a:xfrm>
+          <a:prstGeom prst="straightConnector1">
+            <a:avLst/>
+          </a:prstGeom>
+          <a:ln>
+            <a:solidFill>
+              <a:srgbClr val="0070C0"/>
+            </a:solidFill>
+            <a:tailEnd type="triangle"/>
+          </a:ln>
+        </p:spPr>
+        <p:style>
+          <a:lnRef idx="1">
+            <a:schemeClr val="accent6"/>
+          </a:lnRef>
+          <a:fillRef idx="0">
+            <a:schemeClr val="accent6"/>
+          </a:fillRef>
+          <a:effectRef idx="0">
+            <a:schemeClr val="accent6"/>
+          </a:effectRef>
+          <a:fontRef idx="minor">
+            <a:schemeClr val="tx1"/>
+          </a:fontRef>
+        </p:style>
+      </p:cxnSp>
+      <p:cxnSp>
+        <p:nvCxnSpPr>
+          <p:cNvPr id="17" name="Verbinder: gekrümmt 16">
+            <a:extLst>
+              <a:ext uri="{FF2B5EF4-FFF2-40B4-BE49-F238E27FC236}">
+                <a16:creationId xmlns:a16="http://schemas.microsoft.com/office/drawing/2014/main" id="{8C405D80-5155-4E9E-949A-E1ADD1D5663C}"/>
+              </a:ext>
+            </a:extLst>
+          </p:cNvPr>
+          <p:cNvCxnSpPr/>
+          <p:nvPr/>
+        </p:nvCxnSpPr>
+        <p:spPr>
+          <a:xfrm rot="5400000">
+            <a:off x="9085873" y="4568580"/>
+            <a:ext cx="367323" cy="186593"/>
+          </a:xfrm>
+          <a:prstGeom prst="curvedConnector3">
+            <a:avLst>
+              <a:gd name="adj1" fmla="val 92553"/>
+            </a:avLst>
+          </a:prstGeom>
+          <a:ln>
+            <a:tailEnd type="triangle"/>
+          </a:ln>
+        </p:spPr>
+        <p:style>
+          <a:lnRef idx="1">
+            <a:schemeClr val="accent6"/>
+          </a:lnRef>
+          <a:fillRef idx="0">
+            <a:schemeClr val="accent6"/>
+          </a:fillRef>
+          <a:effectRef idx="0">
+            <a:schemeClr val="accent6"/>
+          </a:effectRef>
+          <a:fontRef idx="minor">
+            <a:schemeClr val="tx1"/>
+          </a:fontRef>
+        </p:style>
+      </p:cxnSp>
+      <p:cxnSp>
+        <p:nvCxnSpPr>
+          <p:cNvPr id="23" name="Gerade Verbindung mit Pfeil 22">
+            <a:extLst>
+              <a:ext uri="{FF2B5EF4-FFF2-40B4-BE49-F238E27FC236}">
+                <a16:creationId xmlns:a16="http://schemas.microsoft.com/office/drawing/2014/main" id="{FD7A232E-7102-4359-BCB5-DEE009691C6A}"/>
+              </a:ext>
+            </a:extLst>
+          </p:cNvPr>
+          <p:cNvCxnSpPr>
+            <a:cxnSpLocks/>
+          </p:cNvCxnSpPr>
+          <p:nvPr/>
+        </p:nvCxnSpPr>
+        <p:spPr>
+          <a:xfrm>
+            <a:off x="9778999" y="5449093"/>
+            <a:ext cx="209063" cy="189158"/>
+          </a:xfrm>
+          <a:prstGeom prst="straightConnector1">
+            <a:avLst/>
+          </a:prstGeom>
+          <a:ln>
+            <a:tailEnd type="triangle"/>
+          </a:ln>
+        </p:spPr>
+        <p:style>
+          <a:lnRef idx="1">
+            <a:schemeClr val="accent1"/>
+          </a:lnRef>
+          <a:fillRef idx="0">
+            <a:schemeClr val="accent1"/>
+          </a:fillRef>
+          <a:effectRef idx="0">
+            <a:schemeClr val="accent1"/>
+          </a:effectRef>
+          <a:fontRef idx="minor">
+            <a:schemeClr val="tx1"/>
+          </a:fontRef>
+        </p:style>
+      </p:cxnSp>
+      <p:sp>
+        <p:nvSpPr>
+          <p:cNvPr id="26" name="Textfeld 25">
+            <a:extLst>
+              <a:ext uri="{FF2B5EF4-FFF2-40B4-BE49-F238E27FC236}">
+                <a16:creationId xmlns:a16="http://schemas.microsoft.com/office/drawing/2014/main" id="{F0D7CA79-79CA-4A4B-BA53-7944337227C8}"/>
+              </a:ext>
+            </a:extLst>
+          </p:cNvPr>
+          <p:cNvSpPr txBox="1"/>
+          <p:nvPr/>
+        </p:nvSpPr>
+        <p:spPr>
+          <a:xfrm>
+            <a:off x="9362831" y="4275015"/>
+            <a:ext cx="1053494" cy="276999"/>
+          </a:xfrm>
+          <a:prstGeom prst="rect">
+            <a:avLst/>
+          </a:prstGeom>
+          <a:noFill/>
+        </p:spPr>
+        <p:txBody>
+          <a:bodyPr wrap="none" rtlCol="0">
+            <a:spAutoFit/>
+          </a:bodyPr>
+          <a:lstStyle/>
+          <a:p>
+            <a:r>
+              <a:rPr lang="de-CH" sz="1200" dirty="0"/>
+              <a:t>global </a:t>
+            </a:r>
+            <a:r>
+              <a:rPr lang="de-CH" sz="1200" dirty="0" err="1"/>
+              <a:t>vector</a:t>
+            </a:r>
+            <a:endParaRPr lang="de-CH" sz="1200" dirty="0"/>
+          </a:p>
+        </p:txBody>
+      </p:sp>
+      <p:sp>
+        <p:nvSpPr>
+          <p:cNvPr id="27" name="Textfeld 26">
+            <a:extLst>
+              <a:ext uri="{FF2B5EF4-FFF2-40B4-BE49-F238E27FC236}">
+                <a16:creationId xmlns:a16="http://schemas.microsoft.com/office/drawing/2014/main" id="{F1439F5E-B873-4A65-A0F7-2A8E944127DD}"/>
+              </a:ext>
+            </a:extLst>
+          </p:cNvPr>
+          <p:cNvSpPr txBox="1"/>
+          <p:nvPr/>
+        </p:nvSpPr>
+        <p:spPr>
+          <a:xfrm>
+            <a:off x="9995691" y="5301007"/>
+            <a:ext cx="995785" cy="276999"/>
+          </a:xfrm>
+          <a:prstGeom prst="rect">
+            <a:avLst/>
+          </a:prstGeom>
+          <a:noFill/>
+        </p:spPr>
+        <p:txBody>
+          <a:bodyPr wrap="none" rtlCol="0">
+            <a:spAutoFit/>
+          </a:bodyPr>
+          <a:lstStyle/>
+          <a:p>
+            <a:r>
+              <a:rPr lang="de-CH" sz="1200" dirty="0" err="1"/>
+              <a:t>current</a:t>
+            </a:r>
+            <a:r>
+              <a:rPr lang="de-CH" sz="1200" dirty="0"/>
+              <a:t> </a:t>
+            </a:r>
+            <a:r>
+              <a:rPr lang="de-CH" sz="1200" dirty="0" err="1"/>
+              <a:t>step</a:t>
+            </a:r>
+            <a:endParaRPr lang="de-CH" sz="1200" dirty="0"/>
           </a:p>
         </p:txBody>
       </p:sp>
     </p:spTree>
     <p:extLst>
       <p:ext uri="{BB962C8B-B14F-4D97-AF65-F5344CB8AC3E}">
-        <p14:creationId xmlns:p14="http://schemas.microsoft.com/office/powerpoint/2010/main" xmlns="" val="2637277297"/>
+        <p14:creationId xmlns:p14="http://schemas.microsoft.com/office/powerpoint/2010/main" val="2637277297"/>
       </p:ext>
     </p:extLst>
   </p:cSld>
@@ -6114,7 +6611,7 @@
           <p:cNvPr id="6" name="Inhaltsplatzhalter 5">
             <a:extLst>
               <a:ext uri="{FF2B5EF4-FFF2-40B4-BE49-F238E27FC236}">
-                <a16:creationId xmlns:a16="http://schemas.microsoft.com/office/drawing/2014/main" xmlns="" id="{28325709-A1B0-405E-9C6E-6925E5EA7336}"/>
+                <a16:creationId xmlns:a16="http://schemas.microsoft.com/office/drawing/2014/main" id="{28325709-A1B0-405E-9C6E-6925E5EA7336}"/>
               </a:ext>
             </a:extLst>
           </p:cNvPr>
@@ -6129,7 +6626,7 @@
           <a:blip r:embed="rId2" cstate="print">
             <a:extLst>
               <a:ext uri="{28A0092B-C50C-407E-A947-70E740481C1C}">
-                <a14:useLocalDpi xmlns:a14="http://schemas.microsoft.com/office/drawing/2010/main" xmlns="" val="0"/>
+                <a14:useLocalDpi xmlns:a14="http://schemas.microsoft.com/office/drawing/2010/main" val="0"/>
               </a:ext>
             </a:extLst>
           </a:blip>
@@ -6149,7 +6646,7 @@
           <p:cNvPr id="2" name="Titel 1">
             <a:extLst>
               <a:ext uri="{FF2B5EF4-FFF2-40B4-BE49-F238E27FC236}">
-                <a16:creationId xmlns:a16="http://schemas.microsoft.com/office/drawing/2014/main" xmlns="" id="{55E02C53-6EB1-47A8-A22E-25E3C46690C9}"/>
+                <a16:creationId xmlns:a16="http://schemas.microsoft.com/office/drawing/2014/main" id="{55E02C53-6EB1-47A8-A22E-25E3C46690C9}"/>
               </a:ext>
             </a:extLst>
           </p:cNvPr>
@@ -6166,25 +6663,24 @@
           <a:lstStyle/>
           <a:p>
             <a:r>
-              <a:rPr lang="en-US" dirty="0" smtClean="0"/>
+              <a:rPr lang="en-US" dirty="0"/>
               <a:t>Conducted experiments  </a:t>
             </a:r>
             <a:br>
-              <a:rPr lang="en-US" dirty="0" smtClean="0"/>
+              <a:rPr lang="en-US" dirty="0"/>
             </a:br>
             <a:r>
-              <a:rPr lang="en-US" dirty="0" smtClean="0"/>
+              <a:rPr lang="en-US" dirty="0"/>
               <a:t>by M. </a:t>
             </a:r>
             <a:r>
-              <a:rPr lang="en-US" dirty="0" err="1" smtClean="0"/>
+              <a:rPr lang="en-US" dirty="0" err="1"/>
               <a:t>Collet</a:t>
             </a:r>
             <a:r>
-              <a:rPr lang="en-US" dirty="0" smtClean="0"/>
+              <a:rPr lang="en-US" dirty="0"/>
               <a:t> et al. </a:t>
             </a:r>
-            <a:endParaRPr lang="en-US" dirty="0"/>
           </a:p>
         </p:txBody>
       </p:sp>
@@ -6193,7 +6689,7 @@
           <p:cNvPr id="4" name="Fußzeilenplatzhalter 3">
             <a:extLst>
               <a:ext uri="{FF2B5EF4-FFF2-40B4-BE49-F238E27FC236}">
-                <a16:creationId xmlns:a16="http://schemas.microsoft.com/office/drawing/2014/main" xmlns="" id="{DA1791D4-4B12-4BAF-B27E-C75AA3A13325}"/>
+                <a16:creationId xmlns:a16="http://schemas.microsoft.com/office/drawing/2014/main" id="{DA1791D4-4B12-4BAF-B27E-C75AA3A13325}"/>
               </a:ext>
             </a:extLst>
           </p:cNvPr>
@@ -6222,7 +6718,7 @@
           <p:cNvPr id="7" name="Inhaltsplatzhalter 2">
             <a:extLst>
               <a:ext uri="{FF2B5EF4-FFF2-40B4-BE49-F238E27FC236}">
-                <a16:creationId xmlns:a16="http://schemas.microsoft.com/office/drawing/2014/main" xmlns="" id="{B87D4091-D7C0-4243-80C3-8BE547EE03B1}"/>
+                <a16:creationId xmlns:a16="http://schemas.microsoft.com/office/drawing/2014/main" id="{B87D4091-D7C0-4243-80C3-8BE547EE03B1}"/>
               </a:ext>
             </a:extLst>
           </p:cNvPr>
@@ -6410,34 +6906,34 @@
           </a:lstStyle>
           <a:p>
             <a:r>
-              <a:rPr lang="en-US" dirty="0" smtClean="0"/>
+              <a:rPr lang="en-US" dirty="0"/>
               <a:t>The desert ants were trained on setup A</a:t>
             </a:r>
           </a:p>
           <a:p>
             <a:r>
-              <a:rPr lang="en-US" dirty="0" smtClean="0"/>
+              <a:rPr lang="en-US" dirty="0"/>
               <a:t>They were picked up at next or feeder</a:t>
             </a:r>
           </a:p>
           <a:p>
             <a:r>
-              <a:rPr lang="en-US" dirty="0" smtClean="0"/>
+              <a:rPr lang="en-US" dirty="0"/>
               <a:t>Launching position is always the feeder</a:t>
             </a:r>
           </a:p>
           <a:p>
-            <a:endParaRPr lang="en-US" dirty="0" smtClean="0"/>
-          </a:p>
-          <a:p>
-            <a:r>
-              <a:rPr lang="en-US" dirty="0" smtClean="0"/>
+            <a:endParaRPr lang="en-US" dirty="0"/>
+          </a:p>
+          <a:p>
+            <a:r>
+              <a:rPr lang="en-US" dirty="0"/>
               <a:t>Test B: pickup feeder – launching feeder</a:t>
             </a:r>
           </a:p>
           <a:p>
             <a:r>
-              <a:rPr lang="en-US" dirty="0" smtClean="0"/>
+              <a:rPr lang="en-US" dirty="0"/>
               <a:t>Test C: pickup nest – launching feeder</a:t>
             </a:r>
           </a:p>
@@ -6445,16 +6941,16 @@
             <a:pPr>
               <a:buNone/>
             </a:pPr>
-            <a:endParaRPr lang="en-US" dirty="0" smtClean="0"/>
+            <a:endParaRPr lang="en-US" dirty="0"/>
           </a:p>
           <a:p>
             <a:pPr>
               <a:buNone/>
             </a:pPr>
-            <a:endParaRPr lang="en-US" dirty="0" smtClean="0"/>
-          </a:p>
-          <a:p>
-            <a:endParaRPr lang="en-US" dirty="0" smtClean="0"/>
+            <a:endParaRPr lang="en-US" dirty="0"/>
+          </a:p>
+          <a:p>
+            <a:endParaRPr lang="en-US" dirty="0"/>
           </a:p>
           <a:p>
             <a:endParaRPr lang="de-CH" dirty="0"/>
@@ -6467,20 +6963,13 @@
     </p:spTree>
     <p:extLst>
       <p:ext uri="{BB962C8B-B14F-4D97-AF65-F5344CB8AC3E}">
-        <p14:creationId xmlns:p14="http://schemas.microsoft.com/office/powerpoint/2010/main" xmlns="" val="1844967865"/>
+        <p14:creationId xmlns:p14="http://schemas.microsoft.com/office/powerpoint/2010/main" val="1844967865"/>
       </p:ext>
     </p:extLst>
   </p:cSld>
   <p:clrMapOvr>
     <a:masterClrMapping/>
   </p:clrMapOvr>
-  <p:timing>
-    <p:tnLst>
-      <p:par>
-        <p:cTn id="1" dur="indefinite" restart="never" nodeType="tmRoot"/>
-      </p:par>
-    </p:tnLst>
-  </p:timing>
 </p:sld>
 </file>
 
@@ -6566,11 +7055,11 @@
           <a:lstStyle/>
           <a:p>
             <a:r>
-              <a:rPr lang="en-US" dirty="0" smtClean="0"/>
+              <a:rPr lang="en-US" dirty="0"/>
               <a:t>Results Test </a:t>
             </a:r>
             <a:r>
-              <a:rPr lang="en-US" dirty="0" err="1" smtClean="0"/>
+              <a:rPr lang="en-US" dirty="0" err="1"/>
               <a:t>Ba</a:t>
             </a:r>
             <a:endParaRPr lang="en-US" dirty="0"/>
@@ -6617,7 +7106,7 @@
           <a:lstStyle/>
           <a:p>
             <a:r>
-              <a:rPr lang="de-CH" smtClean="0"/>
+              <a:rPr lang="de-CH"/>
               <a:t>Josua Graf, Noah Zarro</a:t>
             </a:r>
             <a:endParaRPr lang="de-CH" dirty="0"/>
@@ -6686,10 +7175,9 @@
           <a:p>
             <a:pPr algn="ctr"/>
             <a:r>
-              <a:rPr lang="en-US" dirty="0" smtClean="0"/>
+              <a:rPr lang="en-US" dirty="0"/>
               <a:t>feeder</a:t>
             </a:r>
-            <a:endParaRPr lang="en-US" dirty="0"/>
           </a:p>
         </p:txBody>
       </p:sp>
@@ -6730,10 +7218,9 @@
           <a:p>
             <a:pPr algn="ctr"/>
             <a:r>
-              <a:rPr lang="en-US" dirty="0" smtClean="0"/>
+              <a:rPr lang="en-US" dirty="0"/>
               <a:t>nest</a:t>
             </a:r>
-            <a:endParaRPr lang="en-US" dirty="0"/>
           </a:p>
         </p:txBody>
       </p:sp>
@@ -6938,10 +7425,9 @@
           <a:p>
             <a:pPr algn="ctr"/>
             <a:r>
-              <a:rPr lang="en-US" dirty="0" smtClean="0"/>
+              <a:rPr lang="en-US" dirty="0"/>
               <a:t>channel</a:t>
             </a:r>
-            <a:endParaRPr lang="en-US" dirty="0"/>
           </a:p>
         </p:txBody>
       </p:sp>
@@ -7162,7 +7648,7 @@
           <a:lstStyle/>
           <a:p>
             <a:r>
-              <a:rPr lang="de-CH" smtClean="0"/>
+              <a:rPr lang="de-CH"/>
               <a:t>Josua Graf, Noah Zarro</a:t>
             </a:r>
             <a:endParaRPr lang="de-CH" dirty="0"/>
@@ -7190,11 +7676,11 @@
           <a:lstStyle/>
           <a:p>
             <a:r>
-              <a:rPr lang="en-US" dirty="0" smtClean="0"/>
+              <a:rPr lang="en-US" dirty="0"/>
               <a:t>Results test </a:t>
             </a:r>
             <a:r>
-              <a:rPr lang="en-US" dirty="0" err="1" smtClean="0"/>
+              <a:rPr lang="en-US" dirty="0" err="1"/>
               <a:t>Bc</a:t>
             </a:r>
             <a:endParaRPr lang="en-US" dirty="0"/>
@@ -7238,10 +7724,9 @@
           <a:p>
             <a:pPr algn="ctr"/>
             <a:r>
-              <a:rPr lang="en-US" dirty="0" smtClean="0"/>
+              <a:rPr lang="en-US" dirty="0"/>
               <a:t>feeder</a:t>
             </a:r>
-            <a:endParaRPr lang="en-US" dirty="0"/>
           </a:p>
         </p:txBody>
       </p:sp>
@@ -7282,10 +7767,9 @@
           <a:p>
             <a:pPr algn="ctr"/>
             <a:r>
-              <a:rPr lang="en-US" dirty="0" smtClean="0"/>
+              <a:rPr lang="en-US" dirty="0"/>
               <a:t>nest</a:t>
             </a:r>
-            <a:endParaRPr lang="en-US" dirty="0"/>
           </a:p>
         </p:txBody>
       </p:sp>
@@ -7449,10 +7933,9 @@
           <a:p>
             <a:pPr algn="ctr"/>
             <a:r>
-              <a:rPr lang="en-US" dirty="0" smtClean="0"/>
+              <a:rPr lang="en-US" dirty="0"/>
               <a:t>channel</a:t>
             </a:r>
-            <a:endParaRPr lang="en-US" dirty="0"/>
           </a:p>
         </p:txBody>
       </p:sp>
@@ -7579,7 +8062,7 @@
           <a:lstStyle/>
           <a:p>
             <a:r>
-              <a:rPr lang="de-CH" smtClean="0"/>
+              <a:rPr lang="de-CH"/>
               <a:t>Josua Graf, Noah Zarro</a:t>
             </a:r>
             <a:endParaRPr lang="de-CH" dirty="0"/>
@@ -7675,7 +8158,7 @@
               <a:defRPr/>
             </a:pPr>
             <a:r>
-              <a:rPr kumimoji="0" lang="de-CH" sz="1200" b="0" i="0" u="none" strike="noStrike" kern="1200" cap="none" spc="0" normalizeH="0" baseline="0" noProof="0" smtClean="0">
+              <a:rPr kumimoji="0" lang="de-CH" sz="1200" b="0" i="0" u="none" strike="noStrike" kern="1200" cap="none" spc="0" normalizeH="0" baseline="0" noProof="0">
                 <a:ln>
                   <a:noFill/>
                 </a:ln>
@@ -7751,7 +8234,7 @@
               <a:defRPr/>
             </a:pPr>
             <a:r>
-              <a:rPr kumimoji="0" lang="en-US" sz="4400" b="0" i="0" u="none" strike="noStrike" kern="1200" cap="none" spc="0" normalizeH="0" baseline="0" noProof="0" dirty="0" smtClean="0">
+              <a:rPr kumimoji="0" lang="en-US" sz="4400" b="0" i="0" u="none" strike="noStrike" kern="1200" cap="none" spc="0" normalizeH="0" baseline="0" noProof="0" dirty="0">
                 <a:ln>
                   <a:noFill/>
                 </a:ln>
@@ -7768,7 +8251,7 @@
               <a:t>Results test </a:t>
             </a:r>
             <a:r>
-              <a:rPr kumimoji="0" lang="en-US" sz="4400" b="0" i="0" u="none" strike="noStrike" kern="1200" cap="none" spc="0" normalizeH="0" baseline="0" noProof="0" dirty="0" err="1" smtClean="0">
+              <a:rPr kumimoji="0" lang="en-US" sz="4400" b="0" i="0" u="none" strike="noStrike" kern="1200" cap="none" spc="0" normalizeH="0" baseline="0" noProof="0" dirty="0" err="1">
                 <a:ln>
                   <a:noFill/>
                 </a:ln>
@@ -7838,10 +8321,9 @@
           <a:p>
             <a:pPr algn="ctr"/>
             <a:r>
-              <a:rPr lang="en-US" dirty="0" smtClean="0"/>
+              <a:rPr lang="en-US" dirty="0"/>
               <a:t>feeder</a:t>
             </a:r>
-            <a:endParaRPr lang="en-US" dirty="0"/>
           </a:p>
         </p:txBody>
       </p:sp>
@@ -7888,26 +8370,13 @@
           <a:p>
             <a:pPr algn="ctr"/>
             <a:r>
-              <a:rPr lang="en-US" dirty="0" smtClean="0">
+              <a:rPr lang="en-US" dirty="0">
                 <a:solidFill>
                   <a:sysClr val="windowText" lastClr="000000"/>
                 </a:solidFill>
               </a:rPr>
-              <a:t>g</a:t>
-            </a:r>
-            <a:r>
-              <a:rPr lang="en-US" dirty="0" smtClean="0">
-                <a:solidFill>
-                  <a:sysClr val="windowText" lastClr="000000"/>
-                </a:solidFill>
-              </a:rPr>
-              <a:t>lobal vector</a:t>
-            </a:r>
-            <a:endParaRPr lang="en-US" dirty="0">
-              <a:solidFill>
-                <a:sysClr val="windowText" lastClr="000000"/>
-              </a:solidFill>
-            </a:endParaRPr>
+              <a:t>global vector</a:t>
+            </a:r>
           </a:p>
         </p:txBody>
       </p:sp>
@@ -8036,10 +8505,9 @@
           <a:p>
             <a:pPr algn="ctr"/>
             <a:r>
-              <a:rPr lang="en-US" dirty="0" smtClean="0"/>
+              <a:rPr lang="en-US" dirty="0"/>
               <a:t>local vector</a:t>
             </a:r>
-            <a:endParaRPr lang="en-US" dirty="0"/>
           </a:p>
         </p:txBody>
       </p:sp>
@@ -8156,13 +8624,6 @@
   <p:clrMapOvr>
     <a:masterClrMapping/>
   </p:clrMapOvr>
-  <p:timing>
-    <p:tnLst>
-      <p:par>
-        <p:cTn id="1" dur="indefinite" restart="never" nodeType="tmRoot"/>
-      </p:par>
-    </p:tnLst>
-  </p:timing>
 </p:sld>
 </file>
 
@@ -8188,7 +8649,7 @@
           <p:cNvPr id="2" name="Titel 1">
             <a:extLst>
               <a:ext uri="{FF2B5EF4-FFF2-40B4-BE49-F238E27FC236}">
-                <a16:creationId xmlns:a16="http://schemas.microsoft.com/office/drawing/2014/main" xmlns="" id="{65DF8E59-4BA7-4110-B2C7-CF4E000C1742}"/>
+                <a16:creationId xmlns:a16="http://schemas.microsoft.com/office/drawing/2014/main" id="{65DF8E59-4BA7-4110-B2C7-CF4E000C1742}"/>
               </a:ext>
             </a:extLst>
           </p:cNvPr>
@@ -8205,10 +8666,9 @@
           <a:lstStyle/>
           <a:p>
             <a:r>
-              <a:rPr lang="en-US" dirty="0" smtClean="0"/>
+              <a:rPr lang="en-US" dirty="0"/>
               <a:t>Second experiment setup</a:t>
             </a:r>
-            <a:endParaRPr lang="en-US" dirty="0"/>
           </a:p>
         </p:txBody>
       </p:sp>
@@ -8217,7 +8677,7 @@
           <p:cNvPr id="4" name="Fußzeilenplatzhalter 3">
             <a:extLst>
               <a:ext uri="{FF2B5EF4-FFF2-40B4-BE49-F238E27FC236}">
-                <a16:creationId xmlns:a16="http://schemas.microsoft.com/office/drawing/2014/main" xmlns="" id="{9F3D7A14-6CA4-407B-B5C8-2A1343848DF3}"/>
+                <a16:creationId xmlns:a16="http://schemas.microsoft.com/office/drawing/2014/main" id="{9F3D7A14-6CA4-407B-B5C8-2A1343848DF3}"/>
               </a:ext>
             </a:extLst>
           </p:cNvPr>
@@ -8246,7 +8706,7 @@
           <p:cNvPr id="7" name="Inhaltsplatzhalter 2">
             <a:extLst>
               <a:ext uri="{FF2B5EF4-FFF2-40B4-BE49-F238E27FC236}">
-                <a16:creationId xmlns:a16="http://schemas.microsoft.com/office/drawing/2014/main" xmlns="" id="{B301AD16-A2FA-4DF1-9540-1FCA7E3D6F60}"/>
+                <a16:creationId xmlns:a16="http://schemas.microsoft.com/office/drawing/2014/main" id="{B301AD16-A2FA-4DF1-9540-1FCA7E3D6F60}"/>
               </a:ext>
             </a:extLst>
           </p:cNvPr>
@@ -8434,25 +8894,25 @@
           </a:lstStyle>
           <a:p>
             <a:r>
-              <a:rPr lang="en-US" dirty="0" smtClean="0"/>
+              <a:rPr lang="en-US" dirty="0"/>
               <a:t>Black cylinders as visible landmarks</a:t>
             </a:r>
           </a:p>
           <a:p>
             <a:r>
-              <a:rPr lang="en-US" dirty="0" smtClean="0"/>
+              <a:rPr lang="en-US" dirty="0"/>
               <a:t>Ants training: walking from the feeder to the nest</a:t>
             </a:r>
           </a:p>
           <a:p>
             <a:r>
-              <a:rPr lang="en-US" dirty="0" smtClean="0"/>
+              <a:rPr lang="en-US" dirty="0"/>
               <a:t>Test 2a: exactly the same as training </a:t>
             </a:r>
           </a:p>
           <a:p>
             <a:r>
-              <a:rPr lang="en-US" dirty="0" smtClean="0"/>
+              <a:rPr lang="en-US" dirty="0"/>
               <a:t>Test 2b: pick up the ants at nest and launching at feeder</a:t>
             </a:r>
           </a:p>
@@ -8460,7 +8920,7 @@
             <a:pPr>
               <a:buNone/>
             </a:pPr>
-            <a:endParaRPr lang="en-US" dirty="0" smtClean="0"/>
+            <a:endParaRPr lang="en-US" dirty="0"/>
           </a:p>
           <a:p>
             <a:endParaRPr lang="de-CH" dirty="0"/>
@@ -8476,20 +8936,13 @@
     </p:spTree>
     <p:extLst>
       <p:ext uri="{BB962C8B-B14F-4D97-AF65-F5344CB8AC3E}">
-        <p14:creationId xmlns:p14="http://schemas.microsoft.com/office/powerpoint/2010/main" xmlns="" val="1816722461"/>
+        <p14:creationId xmlns:p14="http://schemas.microsoft.com/office/powerpoint/2010/main" val="1816722461"/>
       </p:ext>
     </p:extLst>
   </p:cSld>
   <p:clrMapOvr>
     <a:masterClrMapping/>
   </p:clrMapOvr>
-  <p:timing>
-    <p:tnLst>
-      <p:par>
-        <p:cTn id="1" dur="indefinite" restart="never" nodeType="tmRoot"/>
-      </p:par>
-    </p:tnLst>
-  </p:timing>
 </p:sld>
 </file>
 
@@ -8746,7 +9199,7 @@
   <a:extraClrSchemeLst/>
   <a:extLst>
     <a:ext uri="{05A4C25C-085E-4340-85A3-A5531E510DB2}">
-      <thm15:themeFamily xmlns:thm15="http://schemas.microsoft.com/office/thememl/2012/main" xmlns="" name="Office Theme" id="{62F939B6-93AF-4DB8-9C6B-D6C7DFDC589F}" vid="{4A3C46E8-61CC-4603-A589-7422A47A8E4A}"/>
+      <thm15:themeFamily xmlns:thm15="http://schemas.microsoft.com/office/thememl/2012/main" name="Office Theme" id="{62F939B6-93AF-4DB8-9C6B-D6C7DFDC589F}" vid="{4A3C46E8-61CC-4603-A589-7422A47A8E4A}"/>
     </a:ext>
   </a:extLst>
 </a:theme>
@@ -9041,7 +9494,7 @@
   <a:extraClrSchemeLst/>
   <a:extLst>
     <a:ext uri="{05A4C25C-085E-4340-85A3-A5531E510DB2}">
-      <thm15:themeFamily xmlns:thm15="http://schemas.microsoft.com/office/thememl/2012/main" xmlns="" name="Office Theme" id="{62F939B6-93AF-4DB8-9C6B-D6C7DFDC589F}" vid="{4A3C46E8-61CC-4603-A589-7422A47A8E4A}"/>
+      <thm15:themeFamily xmlns:thm15="http://schemas.microsoft.com/office/thememl/2012/main" name="Office Theme" id="{62F939B6-93AF-4DB8-9C6B-D6C7DFDC589F}" vid="{4A3C46E8-61CC-4603-A589-7422A47A8E4A}"/>
     </a:ext>
   </a:extLst>
 </a:theme>

</xml_diff>

<commit_message>
presentation in progress again and again
</commit_message>
<xml_diff>
--- a/final_presentation/Back to home in desert.pptx
+++ b/final_presentation/Back to home in desert.pptx
@@ -5762,7 +5762,12 @@
             <p:ph idx="1"/>
           </p:nvPr>
         </p:nvSpPr>
-        <p:spPr/>
+        <p:spPr>
+          <a:xfrm>
+            <a:off x="838200" y="1825625"/>
+            <a:ext cx="10515600" cy="4351338"/>
+          </a:xfrm>
+        </p:spPr>
         <p:txBody>
           <a:bodyPr/>
           <a:lstStyle/>
@@ -5829,7 +5834,12 @@
             <p:ph type="ftr" sz="quarter" idx="11"/>
           </p:nvPr>
         </p:nvSpPr>
-        <p:spPr/>
+        <p:spPr>
+          <a:xfrm>
+            <a:off x="4038600" y="6356350"/>
+            <a:ext cx="4114800" cy="365125"/>
+          </a:xfrm>
+        </p:spPr>
         <p:txBody>
           <a:bodyPr/>
           <a:lstStyle/>
@@ -5869,7 +5879,7 @@
         </p:blipFill>
         <p:spPr>
           <a:xfrm>
-            <a:off x="6873438" y="4806461"/>
+            <a:off x="8596084" y="4149968"/>
             <a:ext cx="501475" cy="581758"/>
           </a:xfrm>
           <a:prstGeom prst="rect">
@@ -5879,56 +5889,140 @@
       </p:pic>
       <p:sp>
         <p:nvSpPr>
-          <p:cNvPr id="9" name="Sonne 8">
-            <a:extLst>
-              <a:ext uri="{FF2B5EF4-FFF2-40B4-BE49-F238E27FC236}">
-                <a16:creationId xmlns:a16="http://schemas.microsoft.com/office/drawing/2014/main" id="{D402957D-85FF-48ED-BD80-C1520C81BB5E}"/>
-              </a:ext>
-            </a:extLst>
-          </p:cNvPr>
-          <p:cNvSpPr/>
+          <p:cNvPr id="8" name="Fußzeilenplatzhalter 3">
+            <a:extLst>
+              <a:ext uri="{FF2B5EF4-FFF2-40B4-BE49-F238E27FC236}">
+                <a16:creationId xmlns:a16="http://schemas.microsoft.com/office/drawing/2014/main" id="{39371E5A-CE3A-4E08-A7D2-3AB64E96A14D}"/>
+              </a:ext>
+            </a:extLst>
+          </p:cNvPr>
+          <p:cNvSpPr txBox="1">
+            <a:spLocks/>
+          </p:cNvSpPr>
           <p:nvPr/>
         </p:nvSpPr>
         <p:spPr>
           <a:xfrm>
-            <a:off x="7940351" y="3429000"/>
-            <a:ext cx="503853" cy="503853"/>
-          </a:xfrm>
-          <a:prstGeom prst="sun">
+            <a:off x="6394745" y="6356349"/>
+            <a:ext cx="4114800" cy="365125"/>
+          </a:xfrm>
+          <a:prstGeom prst="rect">
             <a:avLst/>
           </a:prstGeom>
         </p:spPr>
-        <p:style>
-          <a:lnRef idx="2">
-            <a:schemeClr val="accent2">
-              <a:shade val="50000"/>
-            </a:schemeClr>
-          </a:lnRef>
-          <a:fillRef idx="1">
-            <a:schemeClr val="accent2"/>
-          </a:fillRef>
-          <a:effectRef idx="0">
-            <a:schemeClr val="accent2"/>
-          </a:effectRef>
-          <a:fontRef idx="minor">
-            <a:schemeClr val="lt1"/>
-          </a:fontRef>
-        </p:style>
-        <p:txBody>
-          <a:bodyPr rtlCol="0" anchor="ctr"/>
-          <a:lstStyle/>
-          <a:p>
-            <a:pPr algn="ctr"/>
-            <a:endParaRPr lang="de-CH"/>
+        <p:txBody>
+          <a:bodyPr vert="horz" lIns="91440" tIns="45720" rIns="91440" bIns="45720" rtlCol="0" anchor="ctr"/>
+          <a:lstStyle>
+            <a:defPPr>
+              <a:defRPr lang="de-DE"/>
+            </a:defPPr>
+            <a:lvl1pPr marL="0" algn="ctr" defTabSz="914400" rtl="0" eaLnBrk="1" latinLnBrk="0" hangingPunct="1">
+              <a:defRPr sz="1200" kern="1200">
+                <a:solidFill>
+                  <a:schemeClr val="tx1">
+                    <a:tint val="75000"/>
+                  </a:schemeClr>
+                </a:solidFill>
+                <a:latin typeface="+mn-lt"/>
+                <a:ea typeface="+mn-ea"/>
+                <a:cs typeface="+mn-cs"/>
+              </a:defRPr>
+            </a:lvl1pPr>
+            <a:lvl2pPr marL="457200" algn="l" defTabSz="914400" rtl="0" eaLnBrk="1" latinLnBrk="0" hangingPunct="1">
+              <a:defRPr sz="1800" kern="1200">
+                <a:solidFill>
+                  <a:schemeClr val="tx1"/>
+                </a:solidFill>
+                <a:latin typeface="+mn-lt"/>
+                <a:ea typeface="+mn-ea"/>
+                <a:cs typeface="+mn-cs"/>
+              </a:defRPr>
+            </a:lvl2pPr>
+            <a:lvl3pPr marL="914400" algn="l" defTabSz="914400" rtl="0" eaLnBrk="1" latinLnBrk="0" hangingPunct="1">
+              <a:defRPr sz="1800" kern="1200">
+                <a:solidFill>
+                  <a:schemeClr val="tx1"/>
+                </a:solidFill>
+                <a:latin typeface="+mn-lt"/>
+                <a:ea typeface="+mn-ea"/>
+                <a:cs typeface="+mn-cs"/>
+              </a:defRPr>
+            </a:lvl3pPr>
+            <a:lvl4pPr marL="1371600" algn="l" defTabSz="914400" rtl="0" eaLnBrk="1" latinLnBrk="0" hangingPunct="1">
+              <a:defRPr sz="1800" kern="1200">
+                <a:solidFill>
+                  <a:schemeClr val="tx1"/>
+                </a:solidFill>
+                <a:latin typeface="+mn-lt"/>
+                <a:ea typeface="+mn-ea"/>
+                <a:cs typeface="+mn-cs"/>
+              </a:defRPr>
+            </a:lvl4pPr>
+            <a:lvl5pPr marL="1828800" algn="l" defTabSz="914400" rtl="0" eaLnBrk="1" latinLnBrk="0" hangingPunct="1">
+              <a:defRPr sz="1800" kern="1200">
+                <a:solidFill>
+                  <a:schemeClr val="tx1"/>
+                </a:solidFill>
+                <a:latin typeface="+mn-lt"/>
+                <a:ea typeface="+mn-ea"/>
+                <a:cs typeface="+mn-cs"/>
+              </a:defRPr>
+            </a:lvl5pPr>
+            <a:lvl6pPr marL="2286000" algn="l" defTabSz="914400" rtl="0" eaLnBrk="1" latinLnBrk="0" hangingPunct="1">
+              <a:defRPr sz="1800" kern="1200">
+                <a:solidFill>
+                  <a:schemeClr val="tx1"/>
+                </a:solidFill>
+                <a:latin typeface="+mn-lt"/>
+                <a:ea typeface="+mn-ea"/>
+                <a:cs typeface="+mn-cs"/>
+              </a:defRPr>
+            </a:lvl6pPr>
+            <a:lvl7pPr marL="2743200" algn="l" defTabSz="914400" rtl="0" eaLnBrk="1" latinLnBrk="0" hangingPunct="1">
+              <a:defRPr sz="1800" kern="1200">
+                <a:solidFill>
+                  <a:schemeClr val="tx1"/>
+                </a:solidFill>
+                <a:latin typeface="+mn-lt"/>
+                <a:ea typeface="+mn-ea"/>
+                <a:cs typeface="+mn-cs"/>
+              </a:defRPr>
+            </a:lvl7pPr>
+            <a:lvl8pPr marL="3200400" algn="l" defTabSz="914400" rtl="0" eaLnBrk="1" latinLnBrk="0" hangingPunct="1">
+              <a:defRPr sz="1800" kern="1200">
+                <a:solidFill>
+                  <a:schemeClr val="tx1"/>
+                </a:solidFill>
+                <a:latin typeface="+mn-lt"/>
+                <a:ea typeface="+mn-ea"/>
+                <a:cs typeface="+mn-cs"/>
+              </a:defRPr>
+            </a:lvl8pPr>
+            <a:lvl9pPr marL="3657600" algn="l" defTabSz="914400" rtl="0" eaLnBrk="1" latinLnBrk="0" hangingPunct="1">
+              <a:defRPr sz="1800" kern="1200">
+                <a:solidFill>
+                  <a:schemeClr val="tx1"/>
+                </a:solidFill>
+                <a:latin typeface="+mn-lt"/>
+                <a:ea typeface="+mn-ea"/>
+                <a:cs typeface="+mn-cs"/>
+              </a:defRPr>
+            </a:lvl9pPr>
+          </a:lstStyle>
+          <a:p>
+            <a:r>
+              <a:rPr lang="de-CH" dirty="0"/>
+              <a:t>Images source: https://pixabay.com </a:t>
+            </a:r>
           </a:p>
         </p:txBody>
       </p:sp>
       <p:pic>
         <p:nvPicPr>
-          <p:cNvPr id="1026" name="Picture 2" descr="Clipart ilmenskie rock dull mid4 image">
-            <a:extLst>
-              <a:ext uri="{FF2B5EF4-FFF2-40B4-BE49-F238E27FC236}">
-                <a16:creationId xmlns:a16="http://schemas.microsoft.com/office/drawing/2014/main" id="{48F7896D-80C6-413F-B8AB-C27F29C00238}"/>
+          <p:cNvPr id="1028" name="Picture 4" descr="Vogelnest, Nest, Gras, Zweige, Vogel, Ei, Mutter">
+            <a:extLst>
+              <a:ext uri="{FF2B5EF4-FFF2-40B4-BE49-F238E27FC236}">
+                <a16:creationId xmlns:a16="http://schemas.microsoft.com/office/drawing/2014/main" id="{C072164C-C2F0-4AD8-A1D3-2832A888C6BC}"/>
               </a:ext>
             </a:extLst>
           </p:cNvPr>
@@ -5952,8 +6046,8 @@
         </p:blipFill>
         <p:spPr bwMode="auto">
           <a:xfrm>
-            <a:off x="7940351" y="5097340"/>
-            <a:ext cx="759680" cy="711891"/>
+            <a:off x="9567466" y="5476996"/>
+            <a:ext cx="787918" cy="517892"/>
           </a:xfrm>
           <a:prstGeom prst="rect">
             <a:avLst/>
@@ -5970,6 +6064,95 @@
           </a:extLst>
         </p:spPr>
       </p:pic>
+      <p:pic>
+        <p:nvPicPr>
+          <p:cNvPr id="1030" name="Picture 6" descr="FrÃ¼chte, GemÃ¼se, Artischocke, Banane, Beeren, Kohl">
+            <a:extLst>
+              <a:ext uri="{FF2B5EF4-FFF2-40B4-BE49-F238E27FC236}">
+                <a16:creationId xmlns:a16="http://schemas.microsoft.com/office/drawing/2014/main" id="{8BB47992-18E0-48D1-8182-9F9612BAF5DB}"/>
+              </a:ext>
+            </a:extLst>
+          </p:cNvPr>
+          <p:cNvPicPr>
+            <a:picLocks noChangeAspect="1" noChangeArrowheads="1"/>
+          </p:cNvPicPr>
+          <p:nvPr/>
+        </p:nvPicPr>
+        <p:blipFill>
+          <a:blip r:embed="rId4">
+            <a:extLst>
+              <a:ext uri="{28A0092B-C50C-407E-A947-70E740481C1C}">
+                <a14:useLocalDpi xmlns:a14="http://schemas.microsoft.com/office/drawing/2010/main" val="0"/>
+              </a:ext>
+            </a:extLst>
+          </a:blip>
+          <a:srcRect/>
+          <a:stretch>
+            <a:fillRect/>
+          </a:stretch>
+        </p:blipFill>
+        <p:spPr bwMode="auto">
+          <a:xfrm>
+            <a:off x="8057468" y="3048609"/>
+            <a:ext cx="789354" cy="581326"/>
+          </a:xfrm>
+          <a:prstGeom prst="rect">
+            <a:avLst/>
+          </a:prstGeom>
+          <a:noFill/>
+          <a:extLst>
+            <a:ext uri="{909E8E84-426E-40DD-AFC4-6F175D3DCCD1}">
+              <a14:hiddenFill xmlns:a14="http://schemas.microsoft.com/office/drawing/2010/main">
+                <a:solidFill>
+                  <a:srgbClr val="FFFFFF"/>
+                </a:solidFill>
+              </a14:hiddenFill>
+            </a:ext>
+          </a:extLst>
+        </p:spPr>
+      </p:pic>
+      <p:cxnSp>
+        <p:nvCxnSpPr>
+          <p:cNvPr id="7" name="Gerade Verbindung mit Pfeil 6">
+            <a:extLst>
+              <a:ext uri="{FF2B5EF4-FFF2-40B4-BE49-F238E27FC236}">
+                <a16:creationId xmlns:a16="http://schemas.microsoft.com/office/drawing/2014/main" id="{90D23765-30E3-4139-AC9A-30D36286FBBC}"/>
+              </a:ext>
+            </a:extLst>
+          </p:cNvPr>
+          <p:cNvCxnSpPr/>
+          <p:nvPr/>
+        </p:nvCxnSpPr>
+        <p:spPr>
+          <a:xfrm>
+            <a:off x="8846821" y="4440847"/>
+            <a:ext cx="914594" cy="1036149"/>
+          </a:xfrm>
+          <a:prstGeom prst="straightConnector1">
+            <a:avLst/>
+          </a:prstGeom>
+          <a:ln>
+            <a:solidFill>
+              <a:srgbClr val="0070C0"/>
+            </a:solidFill>
+            <a:tailEnd type="triangle"/>
+          </a:ln>
+        </p:spPr>
+        <p:style>
+          <a:lnRef idx="1">
+            <a:schemeClr val="accent1"/>
+          </a:lnRef>
+          <a:fillRef idx="0">
+            <a:schemeClr val="accent1"/>
+          </a:fillRef>
+          <a:effectRef idx="0">
+            <a:schemeClr val="accent1"/>
+          </a:effectRef>
+          <a:fontRef idx="minor">
+            <a:schemeClr val="tx1"/>
+          </a:fontRef>
+        </p:style>
+      </p:cxnSp>
     </p:spTree>
     <p:extLst>
       <p:ext uri="{BB962C8B-B14F-4D97-AF65-F5344CB8AC3E}">

</xml_diff>